<commit_message>
1128 PPT + 앱 로고 변경
</commit_message>
<xml_diff>
--- a/산출문서/뿡뿡마루_프로젝트PPT.pptx
+++ b/산출문서/뿡뿡마루_프로젝트PPT.pptx
@@ -8,15 +8,16 @@
     <p:sldId id="257" r:id="rId2"/>
     <p:sldId id="258" r:id="rId3"/>
     <p:sldId id="259" r:id="rId4"/>
-    <p:sldId id="260" r:id="rId5"/>
-    <p:sldId id="261" r:id="rId6"/>
-    <p:sldId id="265" r:id="rId7"/>
-    <p:sldId id="262" r:id="rId8"/>
-    <p:sldId id="263" r:id="rId9"/>
-    <p:sldId id="266" r:id="rId10"/>
-    <p:sldId id="264" r:id="rId11"/>
-    <p:sldId id="268" r:id="rId12"/>
-    <p:sldId id="267" r:id="rId13"/>
+    <p:sldId id="270" r:id="rId5"/>
+    <p:sldId id="271" r:id="rId6"/>
+    <p:sldId id="260" r:id="rId7"/>
+    <p:sldId id="261" r:id="rId8"/>
+    <p:sldId id="269" r:id="rId9"/>
+    <p:sldId id="265" r:id="rId10"/>
+    <p:sldId id="262" r:id="rId11"/>
+    <p:sldId id="266" r:id="rId12"/>
+    <p:sldId id="268" r:id="rId13"/>
+    <p:sldId id="267" r:id="rId14"/>
   </p:sldIdLst>
   <p:sldSz cx="12192000" cy="6858000"/>
   <p:notesSz cx="6858000" cy="9144000"/>
@@ -4106,23 +4107,7 @@
                     <a:srgbClr val="FFB5B6"/>
                   </a:solidFill>
                 </a:rPr>
-                <a:t>출처 </a:t>
-              </a:r>
-              <a:r>
-                <a:rPr lang="en-US" altLang="ko-KR" sz="2600" b="1" i="1" kern="0" dirty="0">
-                  <a:solidFill>
-                    <a:srgbClr val="FFB5B6"/>
-                  </a:solidFill>
-                </a:rPr>
-                <a:t>&amp;</a:t>
-              </a:r>
-              <a:r>
-                <a:rPr lang="ko-KR" altLang="en-US" sz="2600" b="1" i="1" kern="0" dirty="0">
-                  <a:solidFill>
-                    <a:srgbClr val="FFB5B6"/>
-                  </a:solidFill>
-                </a:rPr>
-                <a:t> </a:t>
+                <a:t>시스템</a:t>
               </a:r>
               <a:r>
                 <a:rPr lang="ko-KR" altLang="en-US" sz="2600" b="1" i="1" kern="0" dirty="0">
@@ -4130,7 +4115,7 @@
                     <a:schemeClr val="bg1"/>
                   </a:solidFill>
                 </a:rPr>
-                <a:t>도움을 준 사람들</a:t>
+                <a:t> 아키텍처</a:t>
               </a:r>
               <a:endParaRPr lang="en-US" altLang="ko-KR" sz="2600" b="1" i="1" kern="0" dirty="0">
                 <a:solidFill>
@@ -4498,572 +4483,46 @@
           </p:txBody>
         </p:sp>
       </p:grpSp>
-      <p:sp>
-        <p:nvSpPr>
-          <p:cNvPr id="2" name="TextBox 1">
+      <p:pic>
+        <p:nvPicPr>
+          <p:cNvPr id="3" name="그림 2" descr="텍스트, 도표, 스크린샷이(가) 표시된 사진&#10;&#10;자동 생성된 설명">
             <a:extLst>
               <a:ext uri="{FF2B5EF4-FFF2-40B4-BE49-F238E27FC236}">
-                <a16:creationId xmlns:a16="http://schemas.microsoft.com/office/drawing/2014/main" id="{9D021195-F280-7EC4-7FAE-63BB29D47297}"/>
+                <a16:creationId xmlns:a16="http://schemas.microsoft.com/office/drawing/2014/main" id="{8FC157A8-3A81-CB97-BB3F-6C9E89452E6D}"/>
               </a:ext>
             </a:extLst>
           </p:cNvPr>
-          <p:cNvSpPr txBox="1"/>
+          <p:cNvPicPr>
+            <a:picLocks noChangeAspect="1"/>
+          </p:cNvPicPr>
           <p:nvPr/>
-        </p:nvSpPr>
+        </p:nvPicPr>
+        <p:blipFill>
+          <a:blip r:embed="rId2">
+            <a:extLst>
+              <a:ext uri="{28A0092B-C50C-407E-A947-70E740481C1C}">
+                <a14:useLocalDpi xmlns:a14="http://schemas.microsoft.com/office/drawing/2010/main" val="0"/>
+              </a:ext>
+            </a:extLst>
+          </a:blip>
+          <a:stretch>
+            <a:fillRect/>
+          </a:stretch>
+        </p:blipFill>
         <p:spPr>
           <a:xfrm>
-            <a:off x="821040" y="2003345"/>
-            <a:ext cx="5402092" cy="707886"/>
+            <a:off x="1398640" y="1576880"/>
+            <a:ext cx="8559176" cy="5025039"/>
           </a:xfrm>
           <a:prstGeom prst="rect">
             <a:avLst/>
           </a:prstGeom>
-          <a:noFill/>
         </p:spPr>
-        <p:txBody>
-          <a:bodyPr wrap="square" rtlCol="0">
-            <a:spAutoFit/>
-          </a:bodyPr>
-          <a:lstStyle/>
-          <a:p>
-            <a:r>
-              <a:rPr lang="ko-KR" altLang="en-US" dirty="0"/>
-              <a:t>데이터 </a:t>
-            </a:r>
-            <a:r>
-              <a:rPr lang="en-US" altLang="ko-KR" dirty="0"/>
-              <a:t>– AI Hub </a:t>
-            </a:r>
-            <a:r>
-              <a:rPr lang="ko-KR" altLang="en-US" dirty="0"/>
-              <a:t>한국인 안면 이미지</a:t>
-            </a:r>
-            <a:endParaRPr lang="en-US" altLang="ko-KR" dirty="0"/>
-          </a:p>
-          <a:p>
-            <a:r>
-              <a:rPr lang="en-US" altLang="ko-KR" sz="1100" dirty="0">
-                <a:hlinkClick r:id="rId2"/>
-              </a:rPr>
-              <a:t>https://aihub.or.kr/aihubdata/data/view.do?currMenu=&amp;topMenu=&amp;aihubDataSe=data&amp;dataSetSn=83</a:t>
-            </a:r>
-            <a:r>
-              <a:rPr lang="en-US" altLang="ko-KR" sz="1100" dirty="0"/>
-              <a:t>  </a:t>
-            </a:r>
-            <a:endParaRPr lang="ko-KR" altLang="en-US" sz="1100" dirty="0"/>
-          </a:p>
-        </p:txBody>
-      </p:sp>
-      <p:sp>
-        <p:nvSpPr>
-          <p:cNvPr id="3" name="TextBox 2">
-            <a:extLst>
-              <a:ext uri="{FF2B5EF4-FFF2-40B4-BE49-F238E27FC236}">
-                <a16:creationId xmlns:a16="http://schemas.microsoft.com/office/drawing/2014/main" id="{F0F64D22-FA2B-1B99-DF3E-014F898504E4}"/>
-              </a:ext>
-            </a:extLst>
-          </p:cNvPr>
-          <p:cNvSpPr txBox="1"/>
-          <p:nvPr/>
-        </p:nvSpPr>
-        <p:spPr>
-          <a:xfrm>
-            <a:off x="821040" y="4120869"/>
-            <a:ext cx="5402092" cy="1492716"/>
-          </a:xfrm>
-          <a:prstGeom prst="rect">
-            <a:avLst/>
-          </a:prstGeom>
-          <a:noFill/>
-        </p:spPr>
-        <p:txBody>
-          <a:bodyPr wrap="square" rtlCol="0">
-            <a:spAutoFit/>
-          </a:bodyPr>
-          <a:lstStyle/>
-          <a:p>
-            <a:r>
-              <a:rPr lang="ko-KR" altLang="en-US" dirty="0"/>
-              <a:t>뉴스 기사 </a:t>
-            </a:r>
-            <a:r>
-              <a:rPr lang="en-US" altLang="ko-KR" dirty="0"/>
-              <a:t>– </a:t>
-            </a:r>
-            <a:r>
-              <a:rPr lang="ko-KR" altLang="en-US" dirty="0" err="1"/>
-              <a:t>무인단말기</a:t>
-            </a:r>
-            <a:r>
-              <a:rPr lang="en-US" altLang="ko-KR" dirty="0"/>
-              <a:t>(</a:t>
-            </a:r>
-            <a:r>
-              <a:rPr lang="ko-KR" altLang="en-US" dirty="0"/>
-              <a:t>키오스크</a:t>
-            </a:r>
-            <a:r>
-              <a:rPr lang="en-US" altLang="ko-KR" dirty="0"/>
-              <a:t>), ’40</a:t>
-            </a:r>
-            <a:r>
-              <a:rPr lang="ko-KR" altLang="en-US" dirty="0"/>
-              <a:t>조원’ 시장</a:t>
-            </a:r>
-            <a:r>
-              <a:rPr lang="en-US" altLang="ko-KR" dirty="0"/>
-              <a:t>…</a:t>
-            </a:r>
-            <a:r>
-              <a:rPr lang="ko-KR" altLang="en-US" dirty="0"/>
-              <a:t>특허출원</a:t>
-            </a:r>
-            <a:r>
-              <a:rPr lang="en-US" altLang="ko-KR" dirty="0"/>
-              <a:t>, </a:t>
-            </a:r>
-            <a:r>
-              <a:rPr lang="ko-KR" altLang="en-US" dirty="0"/>
-              <a:t>연평균 ‘</a:t>
-            </a:r>
-            <a:r>
-              <a:rPr lang="en-US" altLang="ko-KR" dirty="0"/>
-              <a:t>16%’ </a:t>
-            </a:r>
-            <a:r>
-              <a:rPr lang="ko-KR" altLang="en-US" dirty="0"/>
-              <a:t>급증</a:t>
-            </a:r>
-            <a:r>
-              <a:rPr lang="en-US" altLang="ko-KR" dirty="0"/>
-              <a:t>(</a:t>
-            </a:r>
-            <a:r>
-              <a:rPr lang="ko-KR" altLang="en-US" dirty="0"/>
-              <a:t>최근 </a:t>
-            </a:r>
-            <a:r>
-              <a:rPr lang="en-US" altLang="ko-KR" dirty="0"/>
-              <a:t>10</a:t>
-            </a:r>
-            <a:r>
-              <a:rPr lang="ko-KR" altLang="en-US" dirty="0"/>
-              <a:t>년</a:t>
-            </a:r>
-            <a:r>
-              <a:rPr lang="en-US" altLang="ko-KR" dirty="0"/>
-              <a:t>)</a:t>
-            </a:r>
-          </a:p>
-          <a:p>
-            <a:r>
-              <a:rPr lang="en-US" altLang="ko-KR" sz="1100" dirty="0">
-                <a:hlinkClick r:id="rId3"/>
-              </a:rPr>
-              <a:t>https://www.ipdaily.co.kr/2022/05/24/11/12/10/20612/%EB%AC%B4%EC%9D%B8%EB%8B%A8%EB%A7%90%EA%B8%B0%ED%82%A4%EC%98%A4%EC%8A%A4%ED%81%AC-40%EC%A1%B0%EC%9B%90-%EC%8B%9C%EC%9E%A5-%ED%8A%B9%ED%97%88%EC%B6%9C%EC%9B%90-%EC%97%B0%ED%8F%89%EA%B7%A0-1/</a:t>
-            </a:r>
-            <a:r>
-              <a:rPr lang="en-US" altLang="ko-KR" sz="1100" dirty="0"/>
-              <a:t> </a:t>
-            </a:r>
-            <a:endParaRPr lang="ko-KR" altLang="en-US" sz="1100" dirty="0"/>
-          </a:p>
-        </p:txBody>
-      </p:sp>
-      <p:sp>
-        <p:nvSpPr>
-          <p:cNvPr id="4" name="TextBox 3">
-            <a:extLst>
-              <a:ext uri="{FF2B5EF4-FFF2-40B4-BE49-F238E27FC236}">
-                <a16:creationId xmlns:a16="http://schemas.microsoft.com/office/drawing/2014/main" id="{79982F09-0D14-8D68-66D6-D99EB83E6C85}"/>
-              </a:ext>
-            </a:extLst>
-          </p:cNvPr>
-          <p:cNvSpPr txBox="1"/>
-          <p:nvPr/>
-        </p:nvSpPr>
-        <p:spPr>
-          <a:xfrm>
-            <a:off x="821040" y="2936557"/>
-            <a:ext cx="5402092" cy="984885"/>
-          </a:xfrm>
-          <a:prstGeom prst="rect">
-            <a:avLst/>
-          </a:prstGeom>
-          <a:noFill/>
-        </p:spPr>
-        <p:txBody>
-          <a:bodyPr wrap="square" rtlCol="0">
-            <a:spAutoFit/>
-          </a:bodyPr>
-          <a:lstStyle/>
-          <a:p>
-            <a:r>
-              <a:rPr lang="ko-KR" altLang="en-US" dirty="0"/>
-              <a:t>한국소비자원 </a:t>
-            </a:r>
-            <a:r>
-              <a:rPr lang="en-US" altLang="ko-KR" dirty="0"/>
-              <a:t>– 2022 </a:t>
-            </a:r>
-            <a:r>
-              <a:rPr lang="ko-KR" altLang="en-US" dirty="0"/>
-              <a:t>키오스크 이용실태조사 보도자료</a:t>
-            </a:r>
-            <a:endParaRPr lang="en-US" altLang="ko-KR" dirty="0"/>
-          </a:p>
-          <a:p>
-            <a:r>
-              <a:rPr lang="en-US" altLang="ko-KR" sz="1100" dirty="0">
-                <a:hlinkClick r:id="rId4"/>
-              </a:rPr>
-              <a:t>https://www.kca.go.kr/home/sub.do?menukey=4002&amp;mode=view&amp;no=1003409020</a:t>
-            </a:r>
-            <a:r>
-              <a:rPr lang="en-US" altLang="ko-KR" sz="1100" dirty="0"/>
-              <a:t> </a:t>
-            </a:r>
-            <a:endParaRPr lang="ko-KR" altLang="en-US" sz="1100" dirty="0"/>
-          </a:p>
-        </p:txBody>
-      </p:sp>
-      <p:sp>
-        <p:nvSpPr>
-          <p:cNvPr id="13" name="TextBox 12">
-            <a:extLst>
-              <a:ext uri="{FF2B5EF4-FFF2-40B4-BE49-F238E27FC236}">
-                <a16:creationId xmlns:a16="http://schemas.microsoft.com/office/drawing/2014/main" id="{08E10B7A-0E67-F3E8-0B1C-37AB4FF5B527}"/>
-              </a:ext>
-            </a:extLst>
-          </p:cNvPr>
-          <p:cNvSpPr txBox="1"/>
-          <p:nvPr/>
-        </p:nvSpPr>
-        <p:spPr>
-          <a:xfrm>
-            <a:off x="7263474" y="2482329"/>
-            <a:ext cx="2038424" cy="3077766"/>
-          </a:xfrm>
-          <a:prstGeom prst="rect">
-            <a:avLst/>
-          </a:prstGeom>
-          <a:noFill/>
-        </p:spPr>
-        <p:txBody>
-          <a:bodyPr wrap="square" rtlCol="0">
-            <a:spAutoFit/>
-          </a:bodyPr>
-          <a:lstStyle/>
-          <a:p>
-            <a:pPr algn="ctr"/>
-            <a:r>
-              <a:rPr lang="ko-KR" altLang="en-US" b="1" i="1" dirty="0">
-                <a:solidFill>
-                  <a:srgbClr val="0C2461"/>
-                </a:solidFill>
-              </a:rPr>
-              <a:t>인공지능사관학교</a:t>
-            </a:r>
-            <a:endParaRPr lang="en-US" altLang="ko-KR" b="1" i="1" dirty="0">
-              <a:solidFill>
-                <a:srgbClr val="0C2461"/>
-              </a:solidFill>
-            </a:endParaRPr>
-          </a:p>
-          <a:p>
-            <a:pPr algn="ctr"/>
-            <a:r>
-              <a:rPr lang="ko-KR" altLang="en-US" b="1" i="1" dirty="0">
-                <a:solidFill>
-                  <a:srgbClr val="0C2461"/>
-                </a:solidFill>
-              </a:rPr>
-              <a:t> </a:t>
-            </a:r>
-            <a:endParaRPr lang="en-US" altLang="ko-KR" b="1" i="1" dirty="0">
-              <a:solidFill>
-                <a:srgbClr val="0C2461"/>
-              </a:solidFill>
-            </a:endParaRPr>
-          </a:p>
-          <a:p>
-            <a:pPr algn="ctr"/>
-            <a:r>
-              <a:rPr lang="ko-KR" altLang="en-US" dirty="0" err="1">
-                <a:solidFill>
-                  <a:srgbClr val="0C2461"/>
-                </a:solidFill>
-              </a:rPr>
-              <a:t>조자연</a:t>
-            </a:r>
-            <a:r>
-              <a:rPr lang="ko-KR" altLang="en-US" dirty="0">
-                <a:solidFill>
-                  <a:srgbClr val="0C2461"/>
-                </a:solidFill>
-              </a:rPr>
-              <a:t> 쌤</a:t>
-            </a:r>
-            <a:endParaRPr lang="en-US" altLang="ko-KR" dirty="0">
-              <a:solidFill>
-                <a:srgbClr val="0C2461"/>
-              </a:solidFill>
-            </a:endParaRPr>
-          </a:p>
-          <a:p>
-            <a:pPr algn="ctr"/>
-            <a:r>
-              <a:rPr lang="ko-KR" altLang="en-US" dirty="0">
-                <a:solidFill>
-                  <a:srgbClr val="0C2461"/>
-                </a:solidFill>
-              </a:rPr>
-              <a:t>강성관 쌤</a:t>
-            </a:r>
-            <a:endParaRPr lang="en-US" altLang="ko-KR" dirty="0">
-              <a:solidFill>
-                <a:srgbClr val="0C2461"/>
-              </a:solidFill>
-            </a:endParaRPr>
-          </a:p>
-          <a:p>
-            <a:pPr algn="ctr"/>
-            <a:r>
-              <a:rPr lang="ko-KR" altLang="en-US" dirty="0">
-                <a:solidFill>
-                  <a:srgbClr val="0C2461"/>
-                </a:solidFill>
-              </a:rPr>
-              <a:t>황해도 쌤</a:t>
-            </a:r>
-            <a:endParaRPr lang="en-US" altLang="ko-KR" dirty="0">
-              <a:solidFill>
-                <a:srgbClr val="0C2461"/>
-              </a:solidFill>
-            </a:endParaRPr>
-          </a:p>
-          <a:p>
-            <a:pPr algn="ctr"/>
-            <a:r>
-              <a:rPr lang="ko-KR" altLang="en-US" dirty="0" err="1">
-                <a:solidFill>
-                  <a:srgbClr val="0C2461"/>
-                </a:solidFill>
-              </a:rPr>
-              <a:t>나예호</a:t>
-            </a:r>
-            <a:r>
-              <a:rPr lang="ko-KR" altLang="en-US" dirty="0">
-                <a:solidFill>
-                  <a:srgbClr val="0C2461"/>
-                </a:solidFill>
-              </a:rPr>
-              <a:t> 쌤</a:t>
-            </a:r>
-            <a:endParaRPr lang="en-US" altLang="ko-KR" dirty="0">
-              <a:solidFill>
-                <a:srgbClr val="0C2461"/>
-              </a:solidFill>
-            </a:endParaRPr>
-          </a:p>
-          <a:p>
-            <a:pPr algn="ctr"/>
-            <a:r>
-              <a:rPr lang="ko-KR" altLang="en-US" dirty="0">
-                <a:solidFill>
-                  <a:srgbClr val="0C2461"/>
-                </a:solidFill>
-              </a:rPr>
-              <a:t>임승환 쌤</a:t>
-            </a:r>
-            <a:endParaRPr lang="en-US" altLang="ko-KR" dirty="0">
-              <a:solidFill>
-                <a:srgbClr val="0C2461"/>
-              </a:solidFill>
-            </a:endParaRPr>
-          </a:p>
-          <a:p>
-            <a:pPr algn="ctr"/>
-            <a:r>
-              <a:rPr lang="ko-KR" altLang="en-US" dirty="0">
-                <a:solidFill>
-                  <a:srgbClr val="0C2461"/>
-                </a:solidFill>
-              </a:rPr>
-              <a:t>박원호 쌤</a:t>
-            </a:r>
-            <a:endParaRPr lang="en-US" altLang="ko-KR" dirty="0">
-              <a:solidFill>
-                <a:srgbClr val="0C2461"/>
-              </a:solidFill>
-            </a:endParaRPr>
-          </a:p>
-          <a:p>
-            <a:pPr algn="ctr"/>
-            <a:r>
-              <a:rPr lang="ko-KR" altLang="en-US" dirty="0">
-                <a:solidFill>
-                  <a:srgbClr val="0C2461"/>
-                </a:solidFill>
-              </a:rPr>
-              <a:t>손지영 쌤 </a:t>
-            </a:r>
-            <a:endParaRPr lang="en-US" altLang="ko-KR" dirty="0">
-              <a:solidFill>
-                <a:srgbClr val="0C2461"/>
-              </a:solidFill>
-            </a:endParaRPr>
-          </a:p>
-          <a:p>
-            <a:pPr algn="ctr"/>
-            <a:r>
-              <a:rPr lang="ko-KR" altLang="en-US" sz="1400" dirty="0">
-                <a:solidFill>
-                  <a:srgbClr val="0C2461"/>
-                </a:solidFill>
-              </a:rPr>
-              <a:t>지도해 주신 모든 쌤 들</a:t>
-            </a:r>
-            <a:endParaRPr lang="en-US" altLang="ko-KR" sz="1400" dirty="0">
-              <a:solidFill>
-                <a:srgbClr val="0C2461"/>
-              </a:solidFill>
-            </a:endParaRPr>
-          </a:p>
-          <a:p>
-            <a:endParaRPr lang="en-US" altLang="ko-KR" dirty="0"/>
-          </a:p>
-        </p:txBody>
-      </p:sp>
-      <p:sp>
-        <p:nvSpPr>
-          <p:cNvPr id="14" name="TextBox 13">
-            <a:extLst>
-              <a:ext uri="{FF2B5EF4-FFF2-40B4-BE49-F238E27FC236}">
-                <a16:creationId xmlns:a16="http://schemas.microsoft.com/office/drawing/2014/main" id="{AB69A2C8-445B-D6F2-F518-A1036FC7E7E2}"/>
-              </a:ext>
-            </a:extLst>
-          </p:cNvPr>
-          <p:cNvSpPr txBox="1"/>
-          <p:nvPr/>
-        </p:nvSpPr>
-        <p:spPr>
-          <a:xfrm>
-            <a:off x="8157802" y="1636815"/>
-            <a:ext cx="2038424" cy="369332"/>
-          </a:xfrm>
-          <a:prstGeom prst="rect">
-            <a:avLst/>
-          </a:prstGeom>
-          <a:noFill/>
-        </p:spPr>
-        <p:txBody>
-          <a:bodyPr wrap="square" rtlCol="0">
-            <a:spAutoFit/>
-          </a:bodyPr>
-          <a:lstStyle/>
-          <a:p>
-            <a:r>
-              <a:rPr lang="ko-KR" altLang="en-US" b="1" i="1" dirty="0">
-                <a:solidFill>
-                  <a:srgbClr val="0C2461"/>
-                </a:solidFill>
-              </a:rPr>
-              <a:t>도움을 준 사람들</a:t>
-            </a:r>
-            <a:endParaRPr lang="en-US" altLang="ko-KR" b="1" i="1" dirty="0">
-              <a:solidFill>
-                <a:srgbClr val="0C2461"/>
-              </a:solidFill>
-            </a:endParaRPr>
-          </a:p>
-        </p:txBody>
-      </p:sp>
-      <p:sp>
-        <p:nvSpPr>
-          <p:cNvPr id="16" name="TextBox 15">
-            <a:extLst>
-              <a:ext uri="{FF2B5EF4-FFF2-40B4-BE49-F238E27FC236}">
-                <a16:creationId xmlns:a16="http://schemas.microsoft.com/office/drawing/2014/main" id="{8459118B-8352-8ABB-20DC-347271D623AE}"/>
-              </a:ext>
-            </a:extLst>
-          </p:cNvPr>
-          <p:cNvSpPr txBox="1"/>
-          <p:nvPr/>
-        </p:nvSpPr>
-        <p:spPr>
-          <a:xfrm>
-            <a:off x="9600458" y="3659204"/>
-            <a:ext cx="1920982" cy="1015663"/>
-          </a:xfrm>
-          <a:prstGeom prst="rect">
-            <a:avLst/>
-          </a:prstGeom>
-          <a:noFill/>
-        </p:spPr>
-        <p:txBody>
-          <a:bodyPr wrap="square" rtlCol="0">
-            <a:spAutoFit/>
-          </a:bodyPr>
-          <a:lstStyle/>
-          <a:p>
-            <a:pPr algn="ctr"/>
-            <a:r>
-              <a:rPr lang="ko-KR" altLang="en-US" sz="2400" dirty="0" err="1">
-                <a:solidFill>
-                  <a:srgbClr val="0C2461"/>
-                </a:solidFill>
-              </a:rPr>
-              <a:t>오해성</a:t>
-            </a:r>
-            <a:r>
-              <a:rPr lang="ko-KR" altLang="en-US" i="1" dirty="0">
-                <a:solidFill>
-                  <a:srgbClr val="0C2461"/>
-                </a:solidFill>
-              </a:rPr>
-              <a:t> </a:t>
-            </a:r>
-            <a:r>
-              <a:rPr lang="ko-KR" altLang="en-US" dirty="0">
-                <a:solidFill>
-                  <a:srgbClr val="0C2461"/>
-                </a:solidFill>
-              </a:rPr>
-              <a:t>멘토님</a:t>
-            </a:r>
-            <a:endParaRPr lang="en-US" altLang="ko-KR" dirty="0">
-              <a:solidFill>
-                <a:srgbClr val="0C2461"/>
-              </a:solidFill>
-            </a:endParaRPr>
-          </a:p>
-          <a:p>
-            <a:pPr algn="ctr"/>
-            <a:r>
-              <a:rPr lang="ko-KR" altLang="en-US" i="1" dirty="0">
-                <a:solidFill>
-                  <a:srgbClr val="0C2461"/>
-                </a:solidFill>
-              </a:rPr>
-              <a:t> </a:t>
-            </a:r>
-            <a:endParaRPr lang="en-US" altLang="ko-KR" b="1" i="1" dirty="0">
-              <a:solidFill>
-                <a:srgbClr val="0C2461"/>
-              </a:solidFill>
-            </a:endParaRPr>
-          </a:p>
-          <a:p>
-            <a:endParaRPr lang="ko-KR" altLang="en-US" dirty="0"/>
-          </a:p>
-        </p:txBody>
-      </p:sp>
+      </p:pic>
     </p:spTree>
     <p:extLst>
       <p:ext uri="{BB962C8B-B14F-4D97-AF65-F5344CB8AC3E}">
-        <p14:creationId xmlns:p14="http://schemas.microsoft.com/office/powerpoint/2010/main" val="1688137707"/>
+        <p14:creationId xmlns:p14="http://schemas.microsoft.com/office/powerpoint/2010/main" val="3019334624"/>
       </p:ext>
     </p:extLst>
   </p:cSld>
@@ -5117,7 +4576,7 @@
         </p:nvGrpSpPr>
         <p:grpSpPr>
           <a:xfrm>
-            <a:off x="372000" y="411650"/>
+            <a:off x="372000" y="391885"/>
             <a:ext cx="11448000" cy="6466115"/>
             <a:chOff x="464457" y="391886"/>
             <a:chExt cx="11350172" cy="6466115"/>
@@ -5176,12 +4635,20 @@
                 <a:defRPr/>
               </a:pPr>
               <a:r>
-                <a:rPr lang="en-US" altLang="ko-KR" sz="2600" b="1" i="1" kern="0" dirty="0">
+                <a:rPr lang="ko-KR" altLang="en-US" sz="2600" b="1" i="1" kern="0" dirty="0">
                   <a:solidFill>
                     <a:srgbClr val="FFB5B6"/>
                   </a:solidFill>
                 </a:rPr>
-                <a:t>Team</a:t>
+                <a:t>활용 기술</a:t>
+              </a:r>
+              <a:r>
+                <a:rPr lang="ko-KR" altLang="en-US" sz="2600" b="1" i="1" kern="0" dirty="0">
+                  <a:solidFill>
+                    <a:schemeClr val="bg1"/>
+                  </a:solidFill>
+                </a:rPr>
+                <a:t> </a:t>
               </a:r>
               <a:r>
                 <a:rPr lang="en-US" altLang="ko-KR" sz="2600" b="1" i="1" kern="0" dirty="0">
@@ -5189,15 +4656,15 @@
                     <a:schemeClr val="bg1"/>
                   </a:solidFill>
                 </a:rPr>
-                <a:t> </a:t>
+                <a:t>&amp; </a:t>
               </a:r>
               <a:r>
-                <a:rPr lang="ko-KR" altLang="en-US" sz="2600" b="1" i="1" kern="0" dirty="0" err="1">
+                <a:rPr lang="ko-KR" altLang="en-US" sz="2600" b="1" i="1" kern="0" dirty="0">
                   <a:solidFill>
                     <a:schemeClr val="bg1"/>
                   </a:solidFill>
                 </a:rPr>
-                <a:t>뿡뿡마루</a:t>
+                <a:t>출처</a:t>
               </a:r>
               <a:endParaRPr lang="en-US" altLang="ko-KR" sz="2600" b="1" i="1" kern="0" dirty="0">
                 <a:solidFill>
@@ -5565,6 +5032,795 @@
           </p:txBody>
         </p:sp>
       </p:grpSp>
+      <p:pic>
+        <p:nvPicPr>
+          <p:cNvPr id="3" name="그림 2" descr="텍스트, 스크린샷, 폰트, 도표이(가) 표시된 사진&#10;&#10;자동 생성된 설명">
+            <a:extLst>
+              <a:ext uri="{FF2B5EF4-FFF2-40B4-BE49-F238E27FC236}">
+                <a16:creationId xmlns:a16="http://schemas.microsoft.com/office/drawing/2014/main" id="{D67D7244-6B39-541C-1DDA-7ACCE02CE02C}"/>
+              </a:ext>
+            </a:extLst>
+          </p:cNvPr>
+          <p:cNvPicPr>
+            <a:picLocks noChangeAspect="1"/>
+          </p:cNvPicPr>
+          <p:nvPr/>
+        </p:nvPicPr>
+        <p:blipFill>
+          <a:blip r:embed="rId2">
+            <a:extLst>
+              <a:ext uri="{28A0092B-C50C-407E-A947-70E740481C1C}">
+                <a14:useLocalDpi xmlns:a14="http://schemas.microsoft.com/office/drawing/2010/main" val="0"/>
+              </a:ext>
+            </a:extLst>
+          </a:blip>
+          <a:stretch>
+            <a:fillRect/>
+          </a:stretch>
+        </p:blipFill>
+        <p:spPr>
+          <a:xfrm>
+            <a:off x="693908" y="2177762"/>
+            <a:ext cx="5915151" cy="3445798"/>
+          </a:xfrm>
+          <a:prstGeom prst="rect">
+            <a:avLst/>
+          </a:prstGeom>
+        </p:spPr>
+      </p:pic>
+      <p:sp>
+        <p:nvSpPr>
+          <p:cNvPr id="2" name="TextBox 1">
+            <a:extLst>
+              <a:ext uri="{FF2B5EF4-FFF2-40B4-BE49-F238E27FC236}">
+                <a16:creationId xmlns:a16="http://schemas.microsoft.com/office/drawing/2014/main" id="{ABA031E3-BBBD-A04B-1CE5-4DA5189217D3}"/>
+              </a:ext>
+            </a:extLst>
+          </p:cNvPr>
+          <p:cNvSpPr txBox="1"/>
+          <p:nvPr/>
+        </p:nvSpPr>
+        <p:spPr>
+          <a:xfrm>
+            <a:off x="6096000" y="2076567"/>
+            <a:ext cx="5402092" cy="707886"/>
+          </a:xfrm>
+          <a:prstGeom prst="rect">
+            <a:avLst/>
+          </a:prstGeom>
+          <a:noFill/>
+        </p:spPr>
+        <p:txBody>
+          <a:bodyPr wrap="square" rtlCol="0">
+            <a:spAutoFit/>
+          </a:bodyPr>
+          <a:lstStyle/>
+          <a:p>
+            <a:pPr algn="r"/>
+            <a:r>
+              <a:rPr lang="ko-KR" altLang="en-US" dirty="0"/>
+              <a:t>데이터 </a:t>
+            </a:r>
+            <a:r>
+              <a:rPr lang="en-US" altLang="ko-KR" dirty="0"/>
+              <a:t>– AI Hub </a:t>
+            </a:r>
+            <a:r>
+              <a:rPr lang="ko-KR" altLang="en-US" dirty="0"/>
+              <a:t>한국인 안면 이미지</a:t>
+            </a:r>
+            <a:endParaRPr lang="en-US" altLang="ko-KR" dirty="0"/>
+          </a:p>
+          <a:p>
+            <a:pPr algn="r"/>
+            <a:r>
+              <a:rPr lang="en-US" altLang="ko-KR" sz="1100" dirty="0">
+                <a:hlinkClick r:id="rId3"/>
+              </a:rPr>
+              <a:t>https://aihub.or.kr/aihubdata/data/view.do?currMenu=&amp;topMenu=&amp;aihubDataSe=data&amp;dataSetSn=83</a:t>
+            </a:r>
+            <a:r>
+              <a:rPr lang="en-US" altLang="ko-KR" sz="1100" dirty="0"/>
+              <a:t>  </a:t>
+            </a:r>
+            <a:endParaRPr lang="ko-KR" altLang="en-US" sz="1100" dirty="0"/>
+          </a:p>
+        </p:txBody>
+      </p:sp>
+      <p:sp>
+        <p:nvSpPr>
+          <p:cNvPr id="4" name="TextBox 3">
+            <a:extLst>
+              <a:ext uri="{FF2B5EF4-FFF2-40B4-BE49-F238E27FC236}">
+                <a16:creationId xmlns:a16="http://schemas.microsoft.com/office/drawing/2014/main" id="{FB8E7A80-088B-1E3D-2020-B5A5920B4626}"/>
+              </a:ext>
+            </a:extLst>
+          </p:cNvPr>
+          <p:cNvSpPr txBox="1"/>
+          <p:nvPr/>
+        </p:nvSpPr>
+        <p:spPr>
+          <a:xfrm>
+            <a:off x="6223132" y="4547667"/>
+            <a:ext cx="5402092" cy="1492716"/>
+          </a:xfrm>
+          <a:prstGeom prst="rect">
+            <a:avLst/>
+          </a:prstGeom>
+          <a:noFill/>
+        </p:spPr>
+        <p:txBody>
+          <a:bodyPr wrap="square" rtlCol="0">
+            <a:spAutoFit/>
+          </a:bodyPr>
+          <a:lstStyle/>
+          <a:p>
+            <a:pPr algn="r"/>
+            <a:r>
+              <a:rPr lang="ko-KR" altLang="en-US" dirty="0"/>
+              <a:t>뉴스 기사 </a:t>
+            </a:r>
+            <a:r>
+              <a:rPr lang="en-US" altLang="ko-KR" dirty="0"/>
+              <a:t>– </a:t>
+            </a:r>
+            <a:r>
+              <a:rPr lang="ko-KR" altLang="en-US" dirty="0" err="1"/>
+              <a:t>무인단말기</a:t>
+            </a:r>
+            <a:r>
+              <a:rPr lang="en-US" altLang="ko-KR" dirty="0"/>
+              <a:t>(</a:t>
+            </a:r>
+            <a:r>
+              <a:rPr lang="ko-KR" altLang="en-US" dirty="0"/>
+              <a:t>키오스크</a:t>
+            </a:r>
+            <a:r>
+              <a:rPr lang="en-US" altLang="ko-KR" dirty="0"/>
+              <a:t>), ’40</a:t>
+            </a:r>
+            <a:r>
+              <a:rPr lang="ko-KR" altLang="en-US" dirty="0"/>
+              <a:t>조원’ 시장</a:t>
+            </a:r>
+            <a:r>
+              <a:rPr lang="en-US" altLang="ko-KR" dirty="0"/>
+              <a:t>…</a:t>
+            </a:r>
+            <a:r>
+              <a:rPr lang="ko-KR" altLang="en-US" dirty="0"/>
+              <a:t>특허출원</a:t>
+            </a:r>
+            <a:r>
+              <a:rPr lang="en-US" altLang="ko-KR" dirty="0"/>
+              <a:t>, </a:t>
+            </a:r>
+            <a:r>
+              <a:rPr lang="ko-KR" altLang="en-US" dirty="0"/>
+              <a:t>연평균 ‘</a:t>
+            </a:r>
+            <a:r>
+              <a:rPr lang="en-US" altLang="ko-KR" dirty="0"/>
+              <a:t>16%’ </a:t>
+            </a:r>
+            <a:r>
+              <a:rPr lang="ko-KR" altLang="en-US" dirty="0"/>
+              <a:t>급증</a:t>
+            </a:r>
+            <a:r>
+              <a:rPr lang="en-US" altLang="ko-KR" dirty="0"/>
+              <a:t>(</a:t>
+            </a:r>
+            <a:r>
+              <a:rPr lang="ko-KR" altLang="en-US" dirty="0"/>
+              <a:t>최근 </a:t>
+            </a:r>
+            <a:r>
+              <a:rPr lang="en-US" altLang="ko-KR" dirty="0"/>
+              <a:t>10</a:t>
+            </a:r>
+            <a:r>
+              <a:rPr lang="ko-KR" altLang="en-US" dirty="0"/>
+              <a:t>년</a:t>
+            </a:r>
+            <a:r>
+              <a:rPr lang="en-US" altLang="ko-KR" dirty="0"/>
+              <a:t>)</a:t>
+            </a:r>
+          </a:p>
+          <a:p>
+            <a:pPr algn="r"/>
+            <a:r>
+              <a:rPr lang="en-US" altLang="ko-KR" sz="1100" dirty="0">
+                <a:hlinkClick r:id="rId4"/>
+              </a:rPr>
+              <a:t>https://www.ipdaily.co.kr/2022/05/24/11/12/10/20612/%EB%AC%B4%EC%9D%B8%EB%8B%A8%EB%A7%90%EA%B8%B0%ED%82%A4%EC%98%A4%EC%8A%A4%ED%81%AC-40%EC%A1%B0%EC%9B%90-%EC%8B%9C%EC%9E%A5-%ED%8A%B9%ED%97%88%EC%B6%9C%EC%9B%90-%EC%97%B0%ED%8F%89%EA%B7%A0-1/</a:t>
+            </a:r>
+            <a:r>
+              <a:rPr lang="en-US" altLang="ko-KR" sz="1100" dirty="0"/>
+              <a:t> </a:t>
+            </a:r>
+            <a:endParaRPr lang="ko-KR" altLang="en-US" sz="1100" dirty="0"/>
+          </a:p>
+        </p:txBody>
+      </p:sp>
+      <p:sp>
+        <p:nvSpPr>
+          <p:cNvPr id="13" name="TextBox 12">
+            <a:extLst>
+              <a:ext uri="{FF2B5EF4-FFF2-40B4-BE49-F238E27FC236}">
+                <a16:creationId xmlns:a16="http://schemas.microsoft.com/office/drawing/2014/main" id="{984E4B22-9346-C71A-517E-D18D9E9E1C60}"/>
+              </a:ext>
+            </a:extLst>
+          </p:cNvPr>
+          <p:cNvSpPr txBox="1"/>
+          <p:nvPr/>
+        </p:nvSpPr>
+        <p:spPr>
+          <a:xfrm>
+            <a:off x="6223132" y="3278918"/>
+            <a:ext cx="5402092" cy="984885"/>
+          </a:xfrm>
+          <a:prstGeom prst="rect">
+            <a:avLst/>
+          </a:prstGeom>
+          <a:noFill/>
+        </p:spPr>
+        <p:txBody>
+          <a:bodyPr wrap="square" rtlCol="0">
+            <a:spAutoFit/>
+          </a:bodyPr>
+          <a:lstStyle/>
+          <a:p>
+            <a:pPr algn="r"/>
+            <a:r>
+              <a:rPr lang="ko-KR" altLang="en-US" dirty="0"/>
+              <a:t>보도 자료 </a:t>
+            </a:r>
+            <a:r>
+              <a:rPr lang="en-US" altLang="ko-KR" dirty="0"/>
+              <a:t>– </a:t>
+            </a:r>
+            <a:r>
+              <a:rPr lang="ko-KR" altLang="en-US" dirty="0"/>
+              <a:t>한국소비자원 </a:t>
+            </a:r>
+            <a:endParaRPr lang="en-US" altLang="ko-KR" dirty="0"/>
+          </a:p>
+          <a:p>
+            <a:pPr algn="r"/>
+            <a:r>
+              <a:rPr lang="en-US" altLang="ko-KR" dirty="0"/>
+              <a:t>2022 </a:t>
+            </a:r>
+            <a:r>
+              <a:rPr lang="ko-KR" altLang="en-US" dirty="0"/>
+              <a:t>키오스크 이용실태조사 보도자료</a:t>
+            </a:r>
+            <a:endParaRPr lang="en-US" altLang="ko-KR" dirty="0"/>
+          </a:p>
+          <a:p>
+            <a:pPr algn="r"/>
+            <a:r>
+              <a:rPr lang="en-US" altLang="ko-KR" sz="1100" dirty="0">
+                <a:hlinkClick r:id="rId5"/>
+              </a:rPr>
+              <a:t>https://www.kca.go.kr/home/sub.do?menukey=4002&amp;mode=view&amp;no=1003409020</a:t>
+            </a:r>
+            <a:r>
+              <a:rPr lang="en-US" altLang="ko-KR" sz="1100" dirty="0"/>
+              <a:t> </a:t>
+            </a:r>
+            <a:endParaRPr lang="ko-KR" altLang="en-US" sz="1100" dirty="0"/>
+          </a:p>
+        </p:txBody>
+      </p:sp>
+    </p:spTree>
+    <p:extLst>
+      <p:ext uri="{BB962C8B-B14F-4D97-AF65-F5344CB8AC3E}">
+        <p14:creationId xmlns:p14="http://schemas.microsoft.com/office/powerpoint/2010/main" val="138636634"/>
+      </p:ext>
+    </p:extLst>
+  </p:cSld>
+  <p:clrMapOvr>
+    <a:masterClrMapping/>
+  </p:clrMapOvr>
+</p:sld>
+</file>
+
+<file path=ppt/slides/slide12.xml><?xml version="1.0" encoding="utf-8"?>
+<p:sld xmlns:a="http://schemas.openxmlformats.org/drawingml/2006/main" xmlns:r="http://schemas.openxmlformats.org/officeDocument/2006/relationships" xmlns:p="http://schemas.openxmlformats.org/presentationml/2006/main">
+  <p:cSld>
+    <p:bg>
+      <p:bgPr>
+        <a:gradFill>
+          <a:gsLst>
+            <a:gs pos="27000">
+              <a:srgbClr val="FFB5B6"/>
+            </a:gs>
+            <a:gs pos="57000">
+              <a:schemeClr val="bg1"/>
+            </a:gs>
+            <a:gs pos="100000">
+              <a:schemeClr val="bg1"/>
+            </a:gs>
+          </a:gsLst>
+          <a:lin ang="5400000" scaled="1"/>
+        </a:gradFill>
+        <a:effectLst/>
+      </p:bgPr>
+    </p:bg>
+    <p:spTree>
+      <p:nvGrpSpPr>
+        <p:cNvPr id="1" name=""/>
+        <p:cNvGrpSpPr/>
+        <p:nvPr/>
+      </p:nvGrpSpPr>
+      <p:grpSpPr>
+        <a:xfrm>
+          <a:off x="0" y="0"/>
+          <a:ext cx="0" cy="0"/>
+          <a:chOff x="0" y="0"/>
+          <a:chExt cx="0" cy="0"/>
+        </a:xfrm>
+      </p:grpSpPr>
+      <p:grpSp>
+        <p:nvGrpSpPr>
+          <p:cNvPr id="12" name="그룹 11"/>
+          <p:cNvGrpSpPr/>
+          <p:nvPr/>
+        </p:nvGrpSpPr>
+        <p:grpSpPr>
+          <a:xfrm>
+            <a:off x="372000" y="411650"/>
+            <a:ext cx="11448000" cy="6466115"/>
+            <a:chOff x="464457" y="391886"/>
+            <a:chExt cx="11350172" cy="6466115"/>
+          </a:xfrm>
+        </p:grpSpPr>
+        <p:sp>
+          <p:nvSpPr>
+            <p:cNvPr id="5" name="양쪽 모서리가 둥근 사각형 4"/>
+            <p:cNvSpPr/>
+            <p:nvPr/>
+          </p:nvSpPr>
+          <p:spPr>
+            <a:xfrm>
+              <a:off x="464457" y="391886"/>
+              <a:ext cx="11350172" cy="6466114"/>
+            </a:xfrm>
+            <a:prstGeom prst="round2SameRect">
+              <a:avLst>
+                <a:gd name="adj1" fmla="val 5121"/>
+                <a:gd name="adj2" fmla="val 0"/>
+              </a:avLst>
+            </a:prstGeom>
+            <a:solidFill>
+              <a:srgbClr val="0C2461"/>
+            </a:solidFill>
+            <a:ln w="22225">
+              <a:solidFill>
+                <a:schemeClr val="bg1"/>
+              </a:solidFill>
+            </a:ln>
+          </p:spPr>
+          <p:style>
+            <a:lnRef idx="2">
+              <a:schemeClr val="accent1">
+                <a:shade val="50000"/>
+              </a:schemeClr>
+            </a:lnRef>
+            <a:fillRef idx="1">
+              <a:schemeClr val="accent1"/>
+            </a:fillRef>
+            <a:effectRef idx="0">
+              <a:schemeClr val="accent1"/>
+            </a:effectRef>
+            <a:fontRef idx="minor">
+              <a:schemeClr val="lt1"/>
+            </a:fontRef>
+          </p:style>
+          <p:txBody>
+            <a:bodyPr rtlCol="0" anchor="t"/>
+            <a:lstStyle/>
+            <a:p>
+              <a:pPr lvl="2" latinLnBrk="0">
+                <a:lnSpc>
+                  <a:spcPct val="150000"/>
+                </a:lnSpc>
+                <a:defRPr/>
+              </a:pPr>
+              <a:r>
+                <a:rPr lang="en-US" altLang="ko-KR" sz="2600" b="1" i="1" kern="0" dirty="0">
+                  <a:solidFill>
+                    <a:srgbClr val="FFB5B6"/>
+                  </a:solidFill>
+                </a:rPr>
+                <a:t>Team</a:t>
+              </a:r>
+              <a:r>
+                <a:rPr lang="en-US" altLang="ko-KR" sz="2600" b="1" i="1" kern="0" dirty="0">
+                  <a:solidFill>
+                    <a:schemeClr val="bg1"/>
+                  </a:solidFill>
+                </a:rPr>
+                <a:t> </a:t>
+              </a:r>
+              <a:r>
+                <a:rPr lang="ko-KR" altLang="en-US" sz="2600" b="1" i="1" kern="0" dirty="0" err="1">
+                  <a:solidFill>
+                    <a:schemeClr val="bg1"/>
+                  </a:solidFill>
+                </a:rPr>
+                <a:t>뿡뿡마루</a:t>
+              </a:r>
+              <a:endParaRPr lang="en-US" altLang="ko-KR" sz="2600" b="1" i="1" kern="0" dirty="0">
+                <a:solidFill>
+                  <a:schemeClr val="bg1"/>
+                </a:solidFill>
+              </a:endParaRPr>
+            </a:p>
+          </p:txBody>
+        </p:sp>
+        <p:sp>
+          <p:nvSpPr>
+            <p:cNvPr id="6" name="양쪽 모서리가 둥근 사각형 5"/>
+            <p:cNvSpPr/>
+            <p:nvPr/>
+          </p:nvSpPr>
+          <p:spPr>
+            <a:xfrm>
+              <a:off x="464457" y="1320801"/>
+              <a:ext cx="11350172" cy="5537200"/>
+            </a:xfrm>
+            <a:prstGeom prst="round2SameRect">
+              <a:avLst>
+                <a:gd name="adj1" fmla="val 6572"/>
+                <a:gd name="adj2" fmla="val 0"/>
+              </a:avLst>
+            </a:prstGeom>
+            <a:solidFill>
+              <a:schemeClr val="bg1"/>
+            </a:solidFill>
+            <a:ln w="22225">
+              <a:solidFill>
+                <a:schemeClr val="bg1"/>
+              </a:solidFill>
+            </a:ln>
+          </p:spPr>
+          <p:style>
+            <a:lnRef idx="2">
+              <a:schemeClr val="accent1">
+                <a:shade val="50000"/>
+              </a:schemeClr>
+            </a:lnRef>
+            <a:fillRef idx="1">
+              <a:schemeClr val="accent1"/>
+            </a:fillRef>
+            <a:effectRef idx="0">
+              <a:schemeClr val="accent1"/>
+            </a:effectRef>
+            <a:fontRef idx="minor">
+              <a:schemeClr val="lt1"/>
+            </a:fontRef>
+          </p:style>
+          <p:txBody>
+            <a:bodyPr rtlCol="0" anchor="ctr"/>
+            <a:lstStyle/>
+            <a:p>
+              <a:pPr algn="ctr"/>
+              <a:endParaRPr lang="ko-KR" altLang="en-US" dirty="0">
+                <a:solidFill>
+                  <a:prstClr val="white"/>
+                </a:solidFill>
+              </a:endParaRPr>
+            </a:p>
+          </p:txBody>
+        </p:sp>
+        <p:sp>
+          <p:nvSpPr>
+            <p:cNvPr id="7" name="자유형 6"/>
+            <p:cNvSpPr/>
+            <p:nvPr/>
+          </p:nvSpPr>
+          <p:spPr>
+            <a:xfrm>
+              <a:off x="909660" y="749801"/>
+              <a:ext cx="112689" cy="197593"/>
+            </a:xfrm>
+            <a:custGeom>
+              <a:avLst/>
+              <a:gdLst>
+                <a:gd name="connsiteX0" fmla="*/ 80683 w 89647"/>
+                <a:gd name="connsiteY0" fmla="*/ 0 h 161365"/>
+                <a:gd name="connsiteX1" fmla="*/ 0 w 89647"/>
+                <a:gd name="connsiteY1" fmla="*/ 89647 h 161365"/>
+                <a:gd name="connsiteX2" fmla="*/ 89647 w 89647"/>
+                <a:gd name="connsiteY2" fmla="*/ 161365 h 161365"/>
+                <a:gd name="connsiteX0" fmla="*/ 80683 w 89647"/>
+                <a:gd name="connsiteY0" fmla="*/ 0 h 161365"/>
+                <a:gd name="connsiteX1" fmla="*/ 0 w 89647"/>
+                <a:gd name="connsiteY1" fmla="*/ 80122 h 161365"/>
+                <a:gd name="connsiteX2" fmla="*/ 89647 w 89647"/>
+                <a:gd name="connsiteY2" fmla="*/ 161365 h 161365"/>
+                <a:gd name="connsiteX0" fmla="*/ 80683 w 89647"/>
+                <a:gd name="connsiteY0" fmla="*/ 0 h 161365"/>
+                <a:gd name="connsiteX1" fmla="*/ 0 w 89647"/>
+                <a:gd name="connsiteY1" fmla="*/ 89647 h 161365"/>
+                <a:gd name="connsiteX2" fmla="*/ 89647 w 89647"/>
+                <a:gd name="connsiteY2" fmla="*/ 161365 h 161365"/>
+                <a:gd name="connsiteX0" fmla="*/ 83064 w 92028"/>
+                <a:gd name="connsiteY0" fmla="*/ 0 h 161365"/>
+                <a:gd name="connsiteX1" fmla="*/ 0 w 92028"/>
+                <a:gd name="connsiteY1" fmla="*/ 87266 h 161365"/>
+                <a:gd name="connsiteX2" fmla="*/ 92028 w 92028"/>
+                <a:gd name="connsiteY2" fmla="*/ 161365 h 161365"/>
+              </a:gdLst>
+              <a:ahLst/>
+              <a:cxnLst>
+                <a:cxn ang="0">
+                  <a:pos x="connsiteX0" y="connsiteY0"/>
+                </a:cxn>
+                <a:cxn ang="0">
+                  <a:pos x="connsiteX1" y="connsiteY1"/>
+                </a:cxn>
+                <a:cxn ang="0">
+                  <a:pos x="connsiteX2" y="connsiteY2"/>
+                </a:cxn>
+              </a:cxnLst>
+              <a:rect l="l" t="t" r="r" b="b"/>
+              <a:pathLst>
+                <a:path w="92028" h="161365">
+                  <a:moveTo>
+                    <a:pt x="83064" y="0"/>
+                  </a:moveTo>
+                  <a:lnTo>
+                    <a:pt x="0" y="87266"/>
+                  </a:lnTo>
+                  <a:lnTo>
+                    <a:pt x="92028" y="161365"/>
+                  </a:lnTo>
+                </a:path>
+              </a:pathLst>
+            </a:custGeom>
+            <a:noFill/>
+            <a:ln w="31750" cap="rnd">
+              <a:solidFill>
+                <a:srgbClr val="FFB5B6"/>
+              </a:solidFill>
+            </a:ln>
+          </p:spPr>
+          <p:style>
+            <a:lnRef idx="2">
+              <a:schemeClr val="accent1">
+                <a:shade val="50000"/>
+              </a:schemeClr>
+            </a:lnRef>
+            <a:fillRef idx="1">
+              <a:schemeClr val="accent1"/>
+            </a:fillRef>
+            <a:effectRef idx="0">
+              <a:schemeClr val="accent1"/>
+            </a:effectRef>
+            <a:fontRef idx="minor">
+              <a:schemeClr val="lt1"/>
+            </a:fontRef>
+          </p:style>
+          <p:txBody>
+            <a:bodyPr rtlCol="0" anchor="ctr"/>
+            <a:lstStyle/>
+            <a:p>
+              <a:pPr algn="ctr"/>
+              <a:endParaRPr lang="ko-KR" altLang="en-US">
+                <a:solidFill>
+                  <a:prstClr val="white"/>
+                </a:solidFill>
+              </a:endParaRPr>
+            </a:p>
+          </p:txBody>
+        </p:sp>
+        <p:sp>
+          <p:nvSpPr>
+            <p:cNvPr id="8" name="타원 7"/>
+            <p:cNvSpPr/>
+            <p:nvPr/>
+          </p:nvSpPr>
+          <p:spPr>
+            <a:xfrm>
+              <a:off x="11112062" y="742754"/>
+              <a:ext cx="72000" cy="72000"/>
+            </a:xfrm>
+            <a:prstGeom prst="ellipse">
+              <a:avLst/>
+            </a:prstGeom>
+            <a:solidFill>
+              <a:srgbClr val="FFB5B6"/>
+            </a:solidFill>
+            <a:ln>
+              <a:noFill/>
+            </a:ln>
+          </p:spPr>
+          <p:style>
+            <a:lnRef idx="2">
+              <a:schemeClr val="accent1">
+                <a:shade val="50000"/>
+              </a:schemeClr>
+            </a:lnRef>
+            <a:fillRef idx="1">
+              <a:schemeClr val="accent1"/>
+            </a:fillRef>
+            <a:effectRef idx="0">
+              <a:schemeClr val="accent1"/>
+            </a:effectRef>
+            <a:fontRef idx="minor">
+              <a:schemeClr val="lt1"/>
+            </a:fontRef>
+          </p:style>
+          <p:txBody>
+            <a:bodyPr rtlCol="0" anchor="ctr"/>
+            <a:lstStyle/>
+            <a:p>
+              <a:pPr algn="ctr"/>
+              <a:endParaRPr lang="ko-KR" altLang="en-US">
+                <a:solidFill>
+                  <a:prstClr val="white"/>
+                </a:solidFill>
+              </a:endParaRPr>
+            </a:p>
+          </p:txBody>
+        </p:sp>
+        <p:sp>
+          <p:nvSpPr>
+            <p:cNvPr id="9" name="타원 8"/>
+            <p:cNvSpPr/>
+            <p:nvPr/>
+          </p:nvSpPr>
+          <p:spPr>
+            <a:xfrm>
+              <a:off x="11252555" y="742754"/>
+              <a:ext cx="72000" cy="72000"/>
+            </a:xfrm>
+            <a:prstGeom prst="ellipse">
+              <a:avLst/>
+            </a:prstGeom>
+            <a:solidFill>
+              <a:srgbClr val="FFB5B6"/>
+            </a:solidFill>
+            <a:ln>
+              <a:noFill/>
+            </a:ln>
+          </p:spPr>
+          <p:style>
+            <a:lnRef idx="2">
+              <a:schemeClr val="accent1">
+                <a:shade val="50000"/>
+              </a:schemeClr>
+            </a:lnRef>
+            <a:fillRef idx="1">
+              <a:schemeClr val="accent1"/>
+            </a:fillRef>
+            <a:effectRef idx="0">
+              <a:schemeClr val="accent1"/>
+            </a:effectRef>
+            <a:fontRef idx="minor">
+              <a:schemeClr val="lt1"/>
+            </a:fontRef>
+          </p:style>
+          <p:txBody>
+            <a:bodyPr rtlCol="0" anchor="ctr"/>
+            <a:lstStyle/>
+            <a:p>
+              <a:pPr algn="ctr"/>
+              <a:endParaRPr lang="ko-KR" altLang="en-US">
+                <a:solidFill>
+                  <a:prstClr val="white"/>
+                </a:solidFill>
+              </a:endParaRPr>
+            </a:p>
+          </p:txBody>
+        </p:sp>
+        <p:sp>
+          <p:nvSpPr>
+            <p:cNvPr id="10" name="타원 9"/>
+            <p:cNvSpPr/>
+            <p:nvPr/>
+          </p:nvSpPr>
+          <p:spPr>
+            <a:xfrm>
+              <a:off x="11112062" y="873684"/>
+              <a:ext cx="72000" cy="72000"/>
+            </a:xfrm>
+            <a:prstGeom prst="ellipse">
+              <a:avLst/>
+            </a:prstGeom>
+            <a:solidFill>
+              <a:srgbClr val="FFB5B6"/>
+            </a:solidFill>
+            <a:ln>
+              <a:noFill/>
+            </a:ln>
+          </p:spPr>
+          <p:style>
+            <a:lnRef idx="2">
+              <a:schemeClr val="accent1">
+                <a:shade val="50000"/>
+              </a:schemeClr>
+            </a:lnRef>
+            <a:fillRef idx="1">
+              <a:schemeClr val="accent1"/>
+            </a:fillRef>
+            <a:effectRef idx="0">
+              <a:schemeClr val="accent1"/>
+            </a:effectRef>
+            <a:fontRef idx="minor">
+              <a:schemeClr val="lt1"/>
+            </a:fontRef>
+          </p:style>
+          <p:txBody>
+            <a:bodyPr rtlCol="0" anchor="ctr"/>
+            <a:lstStyle/>
+            <a:p>
+              <a:pPr algn="ctr"/>
+              <a:endParaRPr lang="ko-KR" altLang="en-US">
+                <a:solidFill>
+                  <a:prstClr val="white"/>
+                </a:solidFill>
+              </a:endParaRPr>
+            </a:p>
+          </p:txBody>
+        </p:sp>
+        <p:sp>
+          <p:nvSpPr>
+            <p:cNvPr id="11" name="타원 10"/>
+            <p:cNvSpPr/>
+            <p:nvPr/>
+          </p:nvSpPr>
+          <p:spPr>
+            <a:xfrm>
+              <a:off x="11252555" y="873684"/>
+              <a:ext cx="72000" cy="72000"/>
+            </a:xfrm>
+            <a:prstGeom prst="ellipse">
+              <a:avLst/>
+            </a:prstGeom>
+            <a:solidFill>
+              <a:srgbClr val="FFB5B6"/>
+            </a:solidFill>
+            <a:ln>
+              <a:noFill/>
+            </a:ln>
+          </p:spPr>
+          <p:style>
+            <a:lnRef idx="2">
+              <a:schemeClr val="accent1">
+                <a:shade val="50000"/>
+              </a:schemeClr>
+            </a:lnRef>
+            <a:fillRef idx="1">
+              <a:schemeClr val="accent1"/>
+            </a:fillRef>
+            <a:effectRef idx="0">
+              <a:schemeClr val="accent1"/>
+            </a:effectRef>
+            <a:fontRef idx="minor">
+              <a:schemeClr val="lt1"/>
+            </a:fontRef>
+          </p:style>
+          <p:txBody>
+            <a:bodyPr rtlCol="0" anchor="ctr"/>
+            <a:lstStyle/>
+            <a:p>
+              <a:pPr algn="ctr"/>
+              <a:endParaRPr lang="ko-KR" altLang="en-US">
+                <a:solidFill>
+                  <a:prstClr val="white"/>
+                </a:solidFill>
+              </a:endParaRPr>
+            </a:p>
+          </p:txBody>
+        </p:sp>
+      </p:grpSp>
       <p:sp>
         <p:nvSpPr>
           <p:cNvPr id="16" name="TextBox 15">
@@ -6657,7 +6913,7 @@
 </p:sld>
 </file>
 
-<file path=ppt/slides/slide12.xml><?xml version="1.0" encoding="utf-8"?>
+<file path=ppt/slides/slide13.xml><?xml version="1.0" encoding="utf-8"?>
 <p:sld xmlns:a="http://schemas.openxmlformats.org/drawingml/2006/main" xmlns:r="http://schemas.openxmlformats.org/officeDocument/2006/relationships" xmlns:p="http://schemas.openxmlformats.org/presentationml/2006/main">
   <p:cSld>
     <p:bg>
@@ -7356,7 +7612,7 @@
                 </a:lnSpc>
               </a:pPr>
               <a:r>
-                <a:rPr lang="ko-KR" altLang="en-US" sz="3200" b="1" i="1" dirty="0">
+                <a:rPr lang="ko-KR" altLang="en-US" sz="3000" b="1" i="1" dirty="0">
                   <a:solidFill>
                     <a:srgbClr val="0C2461"/>
                   </a:solidFill>
@@ -7366,7 +7622,7 @@
                 <a:t>선정 배경 </a:t>
               </a:r>
               <a:r>
-                <a:rPr lang="en-US" altLang="ko-KR" sz="3200" b="1" i="1" dirty="0">
+                <a:rPr lang="en-US" altLang="ko-KR" sz="3000" b="1" i="1" dirty="0">
                   <a:solidFill>
                     <a:srgbClr val="0C2461"/>
                   </a:solidFill>
@@ -7376,7 +7632,7 @@
                 <a:t>&amp; </a:t>
               </a:r>
               <a:r>
-                <a:rPr lang="ko-KR" altLang="en-US" sz="3200" b="1" i="1" dirty="0">
+                <a:rPr lang="ko-KR" altLang="en-US" sz="3000" b="1" i="1" dirty="0">
                   <a:solidFill>
                     <a:srgbClr val="0C2461"/>
                   </a:solidFill>
@@ -7385,7 +7641,7 @@
                 </a:rPr>
                 <a:t>필요성</a:t>
               </a:r>
-              <a:endParaRPr lang="en-US" altLang="ko-KR" sz="3200" b="1" i="1" dirty="0">
+              <a:endParaRPr lang="en-US" altLang="ko-KR" sz="3000" b="1" i="1" dirty="0">
                 <a:solidFill>
                   <a:srgbClr val="0C2461"/>
                 </a:solidFill>
@@ -7400,26 +7656,16 @@
                 </a:lnSpc>
               </a:pPr>
               <a:r>
-                <a:rPr lang="en-US" altLang="ko-KR" sz="3200" b="1" i="1" dirty="0">
+                <a:rPr lang="ko-KR" altLang="en-US" sz="3000" b="1" i="1" dirty="0">
                   <a:solidFill>
                     <a:srgbClr val="0C2461"/>
                   </a:solidFill>
                   <a:latin typeface="맑은 고딕" panose="020B0503020000020004" pitchFamily="50" charset="-127"/>
                   <a:ea typeface="맑은 고딕" panose="020B0503020000020004" pitchFamily="50" charset="-127"/>
                 </a:rPr>
-                <a:t>UI &amp;</a:t>
+                <a:t>유사 서비스</a:t>
               </a:r>
-              <a:r>
-                <a:rPr lang="ko-KR" altLang="en-US" sz="3200" b="1" i="1" dirty="0">
-                  <a:solidFill>
-                    <a:srgbClr val="0C2461"/>
-                  </a:solidFill>
-                  <a:latin typeface="맑은 고딕" panose="020B0503020000020004" pitchFamily="50" charset="-127"/>
-                  <a:ea typeface="맑은 고딕" panose="020B0503020000020004" pitchFamily="50" charset="-127"/>
-                </a:rPr>
-                <a:t> 시연 영상</a:t>
-              </a:r>
-              <a:endParaRPr lang="en-US" altLang="ko-KR" sz="3200" b="1" i="1" dirty="0">
+              <a:endParaRPr lang="en-US" altLang="ko-KR" sz="3000" b="1" i="1" dirty="0">
                 <a:solidFill>
                   <a:srgbClr val="0C2461"/>
                 </a:solidFill>
@@ -7434,38 +7680,26 @@
                 </a:lnSpc>
               </a:pPr>
               <a:r>
-                <a:rPr lang="ko-KR" altLang="en-US" sz="3200" b="1" i="1" kern="0" dirty="0">
+                <a:rPr lang="en-US" altLang="ko-KR" sz="3000" b="1" i="1" dirty="0">
                   <a:solidFill>
                     <a:srgbClr val="0C2461"/>
                   </a:solidFill>
+                  <a:latin typeface="맑은 고딕" panose="020B0503020000020004" pitchFamily="50" charset="-127"/>
+                  <a:ea typeface="맑은 고딕" panose="020B0503020000020004" pitchFamily="50" charset="-127"/>
                 </a:rPr>
-                <a:t>딥러닝 모델 </a:t>
+                <a:t>UI &amp;</a:t>
               </a:r>
               <a:r>
-                <a:rPr lang="en-US" altLang="ko-KR" sz="3200" b="1" i="1" kern="0" dirty="0">
+                <a:rPr lang="ko-KR" altLang="en-US" sz="3000" b="1" i="1" dirty="0">
                   <a:solidFill>
                     <a:srgbClr val="0C2461"/>
                   </a:solidFill>
+                  <a:latin typeface="맑은 고딕" panose="020B0503020000020004" pitchFamily="50" charset="-127"/>
+                  <a:ea typeface="맑은 고딕" panose="020B0503020000020004" pitchFamily="50" charset="-127"/>
                 </a:rPr>
-                <a:t>&amp;</a:t>
+                <a:t> 시연 영상</a:t>
               </a:r>
-              <a:r>
-                <a:rPr lang="ko-KR" altLang="en-US" sz="3200" b="1" i="1" kern="0" dirty="0">
-                  <a:solidFill>
-                    <a:srgbClr val="0C2461"/>
-                  </a:solidFill>
-                </a:rPr>
-                <a:t> </a:t>
-              </a:r>
-              <a:r>
-                <a:rPr lang="en-US" altLang="ko-KR" sz="3200" b="1" i="1" kern="0" dirty="0">
-                  <a:solidFill>
-                    <a:srgbClr val="0C2461"/>
-                  </a:solidFill>
-                </a:rPr>
-                <a:t>DB</a:t>
-              </a:r>
-              <a:endParaRPr lang="en-US" altLang="ko-KR" sz="3200" b="1" i="1" dirty="0">
+              <a:endParaRPr lang="en-US" altLang="ko-KR" sz="3000" b="1" i="1" dirty="0">
                 <a:solidFill>
                   <a:srgbClr val="0C2461"/>
                 </a:solidFill>
@@ -7480,7 +7714,53 @@
                 </a:lnSpc>
               </a:pPr>
               <a:r>
-                <a:rPr lang="en-US" altLang="ko-KR" sz="3200" b="1" i="1" dirty="0">
+                <a:rPr lang="ko-KR" altLang="en-US" sz="3000" b="1" i="1" kern="0" dirty="0">
+                  <a:solidFill>
+                    <a:srgbClr val="0C2461"/>
+                  </a:solidFill>
+                </a:rPr>
+                <a:t>딥러닝 모델 </a:t>
+              </a:r>
+              <a:r>
+                <a:rPr lang="en-US" altLang="ko-KR" sz="3000" b="1" i="1" kern="0" dirty="0">
+                  <a:solidFill>
+                    <a:srgbClr val="0C2461"/>
+                  </a:solidFill>
+                </a:rPr>
+                <a:t>&amp;</a:t>
+              </a:r>
+              <a:r>
+                <a:rPr lang="ko-KR" altLang="en-US" sz="3000" b="1" i="1" kern="0" dirty="0">
+                  <a:solidFill>
+                    <a:srgbClr val="0C2461"/>
+                  </a:solidFill>
+                </a:rPr>
+                <a:t> </a:t>
+              </a:r>
+              <a:r>
+                <a:rPr lang="en-US" altLang="ko-KR" sz="3000" b="1" i="1" kern="0" dirty="0">
+                  <a:solidFill>
+                    <a:srgbClr val="0C2461"/>
+                  </a:solidFill>
+                </a:rPr>
+                <a:t>DB</a:t>
+              </a:r>
+              <a:endParaRPr lang="en-US" altLang="ko-KR" sz="3000" b="1" i="1" dirty="0">
+                <a:solidFill>
+                  <a:srgbClr val="0C2461"/>
+                </a:solidFill>
+                <a:latin typeface="맑은 고딕" panose="020B0503020000020004" pitchFamily="50" charset="-127"/>
+                <a:ea typeface="맑은 고딕" panose="020B0503020000020004" pitchFamily="50" charset="-127"/>
+              </a:endParaRPr>
+            </a:p>
+            <a:p>
+              <a:pPr algn="ctr">
+                <a:lnSpc>
+                  <a:spcPct val="150000"/>
+                </a:lnSpc>
+              </a:pPr>
+              <a:r>
+                <a:rPr lang="en-US" altLang="ko-KR" sz="3000" b="1" i="1" dirty="0">
                   <a:solidFill>
                     <a:srgbClr val="0C2461"/>
                   </a:solidFill>
@@ -7497,7 +7777,27 @@
                 </a:lnSpc>
               </a:pPr>
               <a:r>
-                <a:rPr lang="ko-KR" altLang="en-US" sz="3200" b="1" i="1" dirty="0">
+                <a:rPr lang="ko-KR" altLang="en-US" sz="3000" b="1" i="1" dirty="0">
+                  <a:solidFill>
+                    <a:srgbClr val="0C2461"/>
+                  </a:solidFill>
+                  <a:latin typeface="맑은 고딕" panose="020B0503020000020004" pitchFamily="50" charset="-127"/>
+                  <a:ea typeface="맑은 고딕" panose="020B0503020000020004" pitchFamily="50" charset="-127"/>
+                </a:rPr>
+                <a:t>기술 </a:t>
+              </a:r>
+              <a:r>
+                <a:rPr lang="en-US" altLang="ko-KR" sz="3000" b="1" i="1" dirty="0">
+                  <a:solidFill>
+                    <a:srgbClr val="0C2461"/>
+                  </a:solidFill>
+                  <a:latin typeface="맑은 고딕" panose="020B0503020000020004" pitchFamily="50" charset="-127"/>
+                  <a:ea typeface="맑은 고딕" panose="020B0503020000020004" pitchFamily="50" charset="-127"/>
+                </a:rPr>
+                <a:t>&amp; </a:t>
+              </a:r>
+              <a:r>
+                <a:rPr lang="ko-KR" altLang="en-US" sz="3000" b="1" i="1" dirty="0">
                   <a:solidFill>
                     <a:srgbClr val="0C2461"/>
                   </a:solidFill>
@@ -7506,7 +7806,7 @@
                 </a:rPr>
                 <a:t>출처</a:t>
               </a:r>
-              <a:endParaRPr lang="en-US" altLang="ko-KR" sz="3200" b="1" i="1" dirty="0">
+              <a:endParaRPr lang="en-US" altLang="ko-KR" sz="3000" b="1" i="1" dirty="0">
                 <a:solidFill>
                   <a:srgbClr val="0C2461"/>
                 </a:solidFill>
@@ -7521,7 +7821,7 @@
                 </a:lnSpc>
               </a:pPr>
               <a:r>
-                <a:rPr lang="ko-KR" altLang="en-US" sz="3200" b="1" i="1" dirty="0">
+                <a:rPr lang="ko-KR" altLang="en-US" sz="3000" b="1" i="1" dirty="0">
                   <a:solidFill>
                     <a:srgbClr val="0C2461"/>
                   </a:solidFill>
@@ -8349,129 +8649,12 @@
           </p:txBody>
         </p:sp>
       </p:grpSp>
-      <p:sp>
-        <p:nvSpPr>
-          <p:cNvPr id="74" name="직사각형 73"/>
-          <p:cNvSpPr/>
-          <p:nvPr/>
-        </p:nvSpPr>
-        <p:spPr>
-          <a:xfrm>
-            <a:off x="6864981" y="6161137"/>
-            <a:ext cx="4505980" cy="507127"/>
-          </a:xfrm>
-          <a:prstGeom prst="rect">
-            <a:avLst/>
-          </a:prstGeom>
-        </p:spPr>
-        <p:txBody>
-          <a:bodyPr wrap="square">
-            <a:spAutoFit/>
-          </a:bodyPr>
-          <a:lstStyle/>
-          <a:p>
-            <a:pPr algn="ctr">
-              <a:lnSpc>
-                <a:spcPct val="150000"/>
-              </a:lnSpc>
-            </a:pPr>
-            <a:r>
-              <a:rPr lang="ko-KR" altLang="en-US" sz="1100" b="1" dirty="0">
-                <a:solidFill>
-                  <a:prstClr val="black">
-                    <a:lumMod val="65000"/>
-                    <a:lumOff val="35000"/>
-                  </a:prstClr>
-                </a:solidFill>
-              </a:rPr>
-              <a:t>출처</a:t>
-            </a:r>
-            <a:r>
-              <a:rPr lang="en-US" altLang="ko-KR" sz="1100" b="1" dirty="0">
-                <a:solidFill>
-                  <a:prstClr val="black">
-                    <a:lumMod val="65000"/>
-                    <a:lumOff val="35000"/>
-                  </a:prstClr>
-                </a:solidFill>
-              </a:rPr>
-              <a:t>: </a:t>
-            </a:r>
-            <a:r>
-              <a:rPr lang="ko-KR" altLang="en-US" sz="1100" b="1" dirty="0">
-                <a:solidFill>
-                  <a:prstClr val="black">
-                    <a:lumMod val="65000"/>
-                    <a:lumOff val="35000"/>
-                  </a:prstClr>
-                </a:solidFill>
-              </a:rPr>
-              <a:t>한국소비자원 </a:t>
-            </a:r>
-            <a:r>
-              <a:rPr lang="en-US" altLang="ko-KR" sz="1100" b="1" dirty="0">
-                <a:solidFill>
-                  <a:prstClr val="black">
-                    <a:lumMod val="65000"/>
-                    <a:lumOff val="35000"/>
-                  </a:prstClr>
-                </a:solidFill>
-              </a:rPr>
-              <a:t>221124 </a:t>
-            </a:r>
-            <a:r>
-              <a:rPr lang="ko-KR" altLang="en-US" sz="1100" b="1" dirty="0">
-                <a:solidFill>
-                  <a:prstClr val="black">
-                    <a:lumMod val="65000"/>
-                    <a:lumOff val="35000"/>
-                  </a:prstClr>
-                </a:solidFill>
-              </a:rPr>
-              <a:t>키오스크 이용실태조사 보도자료</a:t>
-            </a:r>
-            <a:br>
-              <a:rPr lang="en-US" altLang="ko-KR" sz="1100" b="1" dirty="0">
-                <a:solidFill>
-                  <a:prstClr val="black">
-                    <a:lumMod val="65000"/>
-                    <a:lumOff val="35000"/>
-                  </a:prstClr>
-                </a:solidFill>
-              </a:rPr>
-            </a:br>
-            <a:r>
-              <a:rPr lang="en-US" altLang="ko-KR" sz="800" b="1" dirty="0">
-                <a:solidFill>
-                  <a:prstClr val="black">
-                    <a:lumMod val="65000"/>
-                    <a:lumOff val="35000"/>
-                  </a:prstClr>
-                </a:solidFill>
-                <a:hlinkClick r:id="rId2"/>
-              </a:rPr>
-              <a:t>https://www.kca.go.kr/home/sub.do?menukey=4002&amp;mode=view&amp;no=1003409020</a:t>
-            </a:r>
-            <a:r>
-              <a:rPr lang="en-US" altLang="ko-KR" sz="800" b="1" dirty="0">
-                <a:solidFill>
-                  <a:prstClr val="black">
-                    <a:lumMod val="65000"/>
-                    <a:lumOff val="35000"/>
-                  </a:prstClr>
-                </a:solidFill>
-              </a:rPr>
-              <a:t> </a:t>
-            </a:r>
-          </a:p>
-        </p:txBody>
-      </p:sp>
       <p:pic>
         <p:nvPicPr>
-          <p:cNvPr id="15" name="그림 14">
+          <p:cNvPr id="19" name="그림 18">
             <a:extLst>
               <a:ext uri="{FF2B5EF4-FFF2-40B4-BE49-F238E27FC236}">
-                <a16:creationId xmlns:a16="http://schemas.microsoft.com/office/drawing/2014/main" id="{1AD51ACF-0082-F6A4-AE10-691D39FA511A}"/>
+                <a16:creationId xmlns:a16="http://schemas.microsoft.com/office/drawing/2014/main" id="{7A1155D1-5EC7-E4D7-3737-E6582B40E3D4}"/>
               </a:ext>
             </a:extLst>
           </p:cNvPr>
@@ -8481,27 +8664,136 @@
           <p:nvPr/>
         </p:nvPicPr>
         <p:blipFill>
-          <a:blip r:embed="rId3"/>
+          <a:blip r:embed="rId2"/>
           <a:stretch>
             <a:fillRect/>
           </a:stretch>
         </p:blipFill>
         <p:spPr>
           <a:xfrm>
-            <a:off x="6699737" y="1688804"/>
-            <a:ext cx="4708020" cy="2600731"/>
+            <a:off x="808386" y="2615520"/>
+            <a:ext cx="5107392" cy="2362922"/>
           </a:xfrm>
           <a:prstGeom prst="rect">
             <a:avLst/>
           </a:prstGeom>
         </p:spPr>
       </p:pic>
+      <p:sp>
+        <p:nvSpPr>
+          <p:cNvPr id="22" name="TextBox 21">
+            <a:extLst>
+              <a:ext uri="{FF2B5EF4-FFF2-40B4-BE49-F238E27FC236}">
+                <a16:creationId xmlns:a16="http://schemas.microsoft.com/office/drawing/2014/main" id="{5882BAE8-BBF7-117F-BA34-892A691FDEC9}"/>
+              </a:ext>
+            </a:extLst>
+          </p:cNvPr>
+          <p:cNvSpPr txBox="1"/>
+          <p:nvPr/>
+        </p:nvSpPr>
+        <p:spPr>
+          <a:xfrm>
+            <a:off x="6470760" y="5856413"/>
+            <a:ext cx="5349240" cy="1031051"/>
+          </a:xfrm>
+          <a:prstGeom prst="rect">
+            <a:avLst/>
+          </a:prstGeom>
+          <a:noFill/>
+        </p:spPr>
+        <p:txBody>
+          <a:bodyPr wrap="square" rtlCol="0">
+            <a:spAutoFit/>
+          </a:bodyPr>
+          <a:lstStyle/>
+          <a:p>
+            <a:pPr algn="r"/>
+            <a:r>
+              <a:rPr lang="ko-KR" altLang="en-US" sz="1100" b="1" dirty="0">
+                <a:solidFill>
+                  <a:prstClr val="black">
+                    <a:lumMod val="65000"/>
+                    <a:lumOff val="35000"/>
+                  </a:prstClr>
+                </a:solidFill>
+              </a:rPr>
+              <a:t>출처</a:t>
+            </a:r>
+            <a:r>
+              <a:rPr lang="en-US" altLang="ko-KR" sz="1100" b="1" dirty="0">
+                <a:solidFill>
+                  <a:prstClr val="black">
+                    <a:lumMod val="65000"/>
+                    <a:lumOff val="35000"/>
+                  </a:prstClr>
+                </a:solidFill>
+              </a:rPr>
+              <a:t>: </a:t>
+            </a:r>
+            <a:r>
+              <a:rPr lang="ko-KR" altLang="en-US" sz="1100" b="1" dirty="0">
+                <a:solidFill>
+                  <a:prstClr val="black">
+                    <a:lumMod val="65000"/>
+                    <a:lumOff val="35000"/>
+                  </a:prstClr>
+                </a:solidFill>
+              </a:rPr>
+              <a:t>국내 키오스크 특허 출원 동향</a:t>
+            </a:r>
+            <a:br>
+              <a:rPr lang="en-US" altLang="ko-KR" sz="1800" b="1" dirty="0">
+                <a:solidFill>
+                  <a:prstClr val="black">
+                    <a:lumMod val="65000"/>
+                    <a:lumOff val="35000"/>
+                  </a:prstClr>
+                </a:solidFill>
+              </a:rPr>
+            </a:br>
+            <a:r>
+              <a:rPr lang="en-US" altLang="ko-KR" sz="800" b="1" dirty="0">
+                <a:solidFill>
+                  <a:prstClr val="black">
+                    <a:lumMod val="65000"/>
+                    <a:lumOff val="35000"/>
+                  </a:prstClr>
+                </a:solidFill>
+                <a:hlinkClick r:id="rId3"/>
+              </a:rPr>
+              <a:t>https://www.ipdaily.co.kr/2022/05/24/11/12/10/20612/%EB%AC%B4%EC%9D%B8%EB%8B%A8%EB%A7%90%EA%B8%B0%ED%82%A4%EC%98%A4%EC%8A%A4%ED%81%AC-40%EC%A1%B0%EC%9B%90-%EC%8B%9C%EC%9E%A5-%ED%8A%B9%ED%97%88%EC%B6%9C%EC%9B%90-%EC%97%B0%ED%8F%89%EA%B7%A0-1/</a:t>
+            </a:r>
+            <a:r>
+              <a:rPr lang="en-US" altLang="ko-KR" sz="800" b="1" dirty="0">
+                <a:solidFill>
+                  <a:prstClr val="black">
+                    <a:lumMod val="65000"/>
+                    <a:lumOff val="35000"/>
+                  </a:prstClr>
+                </a:solidFill>
+              </a:rPr>
+              <a:t> </a:t>
+            </a:r>
+            <a:endParaRPr lang="ko-KR" altLang="en-US" sz="2400" dirty="0">
+              <a:solidFill>
+                <a:prstClr val="white">
+                  <a:lumMod val="65000"/>
+                </a:prstClr>
+              </a:solidFill>
+            </a:endParaRPr>
+          </a:p>
+          <a:p>
+            <a:pPr algn="r"/>
+            <a:endParaRPr lang="ko-KR" altLang="en-US" dirty="0"/>
+          </a:p>
+        </p:txBody>
+      </p:sp>
       <p:pic>
         <p:nvPicPr>
-          <p:cNvPr id="17" name="그림 16" descr="텍스트, 폰트, 스크린샷, 번호이(가) 표시된 사진&#10;&#10;자동 생성된 설명">
+          <p:cNvPr id="24" name="그림 23" descr="텍스트, 스크린샷, 라인, 그래프이(가) 표시된 사진&#10;&#10;자동 생성된 설명">
             <a:extLst>
               <a:ext uri="{FF2B5EF4-FFF2-40B4-BE49-F238E27FC236}">
-                <a16:creationId xmlns:a16="http://schemas.microsoft.com/office/drawing/2014/main" id="{AFDBB3AA-C636-85D5-38E0-1B3D095AEFC9}"/>
+                <a16:creationId xmlns:a16="http://schemas.microsoft.com/office/drawing/2014/main" id="{52C79734-077E-A637-0E15-26AED3447488}"/>
               </a:ext>
             </a:extLst>
           </p:cNvPr>
@@ -8524,182 +8816,8 @@
         </p:blipFill>
         <p:spPr>
           <a:xfrm>
-            <a:off x="6349854" y="4420407"/>
-            <a:ext cx="5334193" cy="1697548"/>
-          </a:xfrm>
-          <a:prstGeom prst="rect">
-            <a:avLst/>
-          </a:prstGeom>
-        </p:spPr>
-      </p:pic>
-      <p:pic>
-        <p:nvPicPr>
-          <p:cNvPr id="19" name="그림 18">
-            <a:extLst>
-              <a:ext uri="{FF2B5EF4-FFF2-40B4-BE49-F238E27FC236}">
-                <a16:creationId xmlns:a16="http://schemas.microsoft.com/office/drawing/2014/main" id="{7A1155D1-5EC7-E4D7-3737-E6582B40E3D4}"/>
-              </a:ext>
-            </a:extLst>
-          </p:cNvPr>
-          <p:cNvPicPr>
-            <a:picLocks noChangeAspect="1"/>
-          </p:cNvPicPr>
-          <p:nvPr/>
-        </p:nvPicPr>
-        <p:blipFill>
-          <a:blip r:embed="rId5"/>
-          <a:stretch>
-            <a:fillRect/>
-          </a:stretch>
-        </p:blipFill>
-        <p:spPr>
-          <a:xfrm>
-            <a:off x="1747339" y="1464430"/>
-            <a:ext cx="3744925" cy="1732580"/>
-          </a:xfrm>
-          <a:prstGeom prst="rect">
-            <a:avLst/>
-          </a:prstGeom>
-        </p:spPr>
-      </p:pic>
-      <p:sp>
-        <p:nvSpPr>
-          <p:cNvPr id="22" name="TextBox 21">
-            <a:extLst>
-              <a:ext uri="{FF2B5EF4-FFF2-40B4-BE49-F238E27FC236}">
-                <a16:creationId xmlns:a16="http://schemas.microsoft.com/office/drawing/2014/main" id="{5882BAE8-BBF7-117F-BA34-892A691FDEC9}"/>
-              </a:ext>
-            </a:extLst>
-          </p:cNvPr>
-          <p:cNvSpPr txBox="1"/>
-          <p:nvPr/>
-        </p:nvSpPr>
-        <p:spPr>
-          <a:xfrm>
-            <a:off x="731566" y="6054374"/>
-            <a:ext cx="5349240" cy="1031051"/>
-          </a:xfrm>
-          <a:prstGeom prst="rect">
-            <a:avLst/>
-          </a:prstGeom>
-          <a:noFill/>
-        </p:spPr>
-        <p:txBody>
-          <a:bodyPr wrap="square" rtlCol="0">
-            <a:spAutoFit/>
-          </a:bodyPr>
-          <a:lstStyle/>
-          <a:p>
-            <a:pPr algn="ctr"/>
-            <a:r>
-              <a:rPr lang="ko-KR" altLang="en-US" sz="1100" b="1" dirty="0">
-                <a:solidFill>
-                  <a:prstClr val="black">
-                    <a:lumMod val="65000"/>
-                    <a:lumOff val="35000"/>
-                  </a:prstClr>
-                </a:solidFill>
-              </a:rPr>
-              <a:t>출처</a:t>
-            </a:r>
-            <a:r>
-              <a:rPr lang="en-US" altLang="ko-KR" sz="1100" b="1" dirty="0">
-                <a:solidFill>
-                  <a:prstClr val="black">
-                    <a:lumMod val="65000"/>
-                    <a:lumOff val="35000"/>
-                  </a:prstClr>
-                </a:solidFill>
-              </a:rPr>
-              <a:t>: </a:t>
-            </a:r>
-            <a:r>
-              <a:rPr lang="ko-KR" altLang="en-US" sz="1100" b="1" dirty="0">
-                <a:solidFill>
-                  <a:prstClr val="black">
-                    <a:lumMod val="65000"/>
-                    <a:lumOff val="35000"/>
-                  </a:prstClr>
-                </a:solidFill>
-              </a:rPr>
-              <a:t>국내 키오스크 특허 출원 동향</a:t>
-            </a:r>
-            <a:br>
-              <a:rPr lang="en-US" altLang="ko-KR" sz="1800" b="1" dirty="0">
-                <a:solidFill>
-                  <a:prstClr val="black">
-                    <a:lumMod val="65000"/>
-                    <a:lumOff val="35000"/>
-                  </a:prstClr>
-                </a:solidFill>
-              </a:rPr>
-            </a:br>
-            <a:r>
-              <a:rPr lang="en-US" altLang="ko-KR" sz="800" b="1" dirty="0">
-                <a:solidFill>
-                  <a:prstClr val="black">
-                    <a:lumMod val="65000"/>
-                    <a:lumOff val="35000"/>
-                  </a:prstClr>
-                </a:solidFill>
-                <a:hlinkClick r:id="rId6"/>
-              </a:rPr>
-              <a:t>https://www.ipdaily.co.kr/2022/05/24/11/12/10/20612/%EB%AC%B4%EC%9D%B8%EB%8B%A8%EB%A7%90%EA%B8%B0%ED%82%A4%EC%98%A4%EC%8A%A4%ED%81%AC-40%EC%A1%B0%EC%9B%90-%EC%8B%9C%EC%9E%A5-%ED%8A%B9%ED%97%88%EC%B6%9C%EC%9B%90-%EC%97%B0%ED%8F%89%EA%B7%A0-1/</a:t>
-            </a:r>
-            <a:r>
-              <a:rPr lang="en-US" altLang="ko-KR" sz="800" b="1" dirty="0">
-                <a:solidFill>
-                  <a:prstClr val="black">
-                    <a:lumMod val="65000"/>
-                    <a:lumOff val="35000"/>
-                  </a:prstClr>
-                </a:solidFill>
-              </a:rPr>
-              <a:t> </a:t>
-            </a:r>
-            <a:endParaRPr lang="ko-KR" altLang="en-US" sz="2400" dirty="0">
-              <a:solidFill>
-                <a:prstClr val="white">
-                  <a:lumMod val="65000"/>
-                </a:prstClr>
-              </a:solidFill>
-            </a:endParaRPr>
-          </a:p>
-          <a:p>
-            <a:endParaRPr lang="ko-KR" altLang="en-US" dirty="0"/>
-          </a:p>
-        </p:txBody>
-      </p:sp>
-      <p:pic>
-        <p:nvPicPr>
-          <p:cNvPr id="24" name="그림 23" descr="텍스트, 스크린샷, 라인, 그래프이(가) 표시된 사진&#10;&#10;자동 생성된 설명">
-            <a:extLst>
-              <a:ext uri="{FF2B5EF4-FFF2-40B4-BE49-F238E27FC236}">
-                <a16:creationId xmlns:a16="http://schemas.microsoft.com/office/drawing/2014/main" id="{52C79734-077E-A637-0E15-26AED3447488}"/>
-              </a:ext>
-            </a:extLst>
-          </p:cNvPr>
-          <p:cNvPicPr>
-            <a:picLocks noChangeAspect="1"/>
-          </p:cNvPicPr>
-          <p:nvPr/>
-        </p:nvPicPr>
-        <p:blipFill>
-          <a:blip r:embed="rId7">
-            <a:extLst>
-              <a:ext uri="{28A0092B-C50C-407E-A947-70E740481C1C}">
-                <a14:useLocalDpi xmlns:a14="http://schemas.microsoft.com/office/drawing/2010/main" val="0"/>
-              </a:ext>
-            </a:extLst>
-          </a:blip>
-          <a:stretch>
-            <a:fillRect/>
-          </a:stretch>
-        </p:blipFill>
-        <p:spPr>
-          <a:xfrm>
-            <a:off x="1412821" y="3310722"/>
-            <a:ext cx="4429326" cy="2743651"/>
+            <a:off x="6117116" y="2297592"/>
+            <a:ext cx="5030572" cy="3116080"/>
           </a:xfrm>
           <a:prstGeom prst="rect">
             <a:avLst/>
@@ -8822,36 +8940,20 @@
                 <a:defRPr/>
               </a:pPr>
               <a:r>
-                <a:rPr lang="en-US" altLang="ko-KR" sz="2600" b="1" i="1" kern="0" dirty="0">
-                  <a:solidFill>
-                    <a:srgbClr val="FFB5B6"/>
-                  </a:solidFill>
-                </a:rPr>
-                <a:t>UI</a:t>
-              </a:r>
-              <a:r>
                 <a:rPr lang="ko-KR" altLang="en-US" sz="2600" b="1" i="1" kern="0" dirty="0">
                   <a:solidFill>
                     <a:srgbClr val="FFB5B6"/>
                   </a:solidFill>
                 </a:rPr>
-                <a:t> </a:t>
+                <a:t>선정배경 </a:t>
               </a:r>
               <a:r>
                 <a:rPr lang="en-US" altLang="ko-KR" sz="2600" b="1" i="1" kern="0" dirty="0">
                   <a:solidFill>
-                    <a:srgbClr val="FFB5B6"/>
+                    <a:schemeClr val="bg1"/>
                   </a:solidFill>
                 </a:rPr>
-                <a:t>&amp;</a:t>
-              </a:r>
-              <a:r>
-                <a:rPr lang="ko-KR" altLang="en-US" sz="2600" b="1" i="1" kern="0" dirty="0">
-                  <a:solidFill>
-                    <a:srgbClr val="FFB5B6"/>
-                  </a:solidFill>
-                </a:rPr>
-                <a:t> </a:t>
+                <a:t>&amp; </a:t>
               </a:r>
               <a:r>
                 <a:rPr lang="ko-KR" altLang="en-US" sz="2600" b="1" i="1" kern="0" dirty="0">
@@ -8859,7 +8961,7 @@
                     <a:schemeClr val="bg1"/>
                   </a:solidFill>
                 </a:rPr>
-                <a:t>시연 영상</a:t>
+                <a:t>필요성</a:t>
               </a:r>
               <a:endParaRPr lang="en-US" altLang="ko-KR" sz="2600" b="1" i="1" kern="0" dirty="0">
                 <a:solidFill>
@@ -9227,12 +9329,129 @@
           </p:txBody>
         </p:sp>
       </p:grpSp>
+      <p:sp>
+        <p:nvSpPr>
+          <p:cNvPr id="74" name="직사각형 73"/>
+          <p:cNvSpPr/>
+          <p:nvPr/>
+        </p:nvSpPr>
+        <p:spPr>
+          <a:xfrm>
+            <a:off x="7314020" y="6180344"/>
+            <a:ext cx="4505980" cy="507127"/>
+          </a:xfrm>
+          <a:prstGeom prst="rect">
+            <a:avLst/>
+          </a:prstGeom>
+        </p:spPr>
+        <p:txBody>
+          <a:bodyPr wrap="square">
+            <a:spAutoFit/>
+          </a:bodyPr>
+          <a:lstStyle/>
+          <a:p>
+            <a:pPr algn="r">
+              <a:lnSpc>
+                <a:spcPct val="150000"/>
+              </a:lnSpc>
+            </a:pPr>
+            <a:r>
+              <a:rPr lang="ko-KR" altLang="en-US" sz="1100" b="1" dirty="0">
+                <a:solidFill>
+                  <a:prstClr val="black">
+                    <a:lumMod val="65000"/>
+                    <a:lumOff val="35000"/>
+                  </a:prstClr>
+                </a:solidFill>
+              </a:rPr>
+              <a:t>출처</a:t>
+            </a:r>
+            <a:r>
+              <a:rPr lang="en-US" altLang="ko-KR" sz="1100" b="1" dirty="0">
+                <a:solidFill>
+                  <a:prstClr val="black">
+                    <a:lumMod val="65000"/>
+                    <a:lumOff val="35000"/>
+                  </a:prstClr>
+                </a:solidFill>
+              </a:rPr>
+              <a:t>: </a:t>
+            </a:r>
+            <a:r>
+              <a:rPr lang="ko-KR" altLang="en-US" sz="1100" b="1" dirty="0">
+                <a:solidFill>
+                  <a:prstClr val="black">
+                    <a:lumMod val="65000"/>
+                    <a:lumOff val="35000"/>
+                  </a:prstClr>
+                </a:solidFill>
+              </a:rPr>
+              <a:t>한국소비자원 </a:t>
+            </a:r>
+            <a:r>
+              <a:rPr lang="en-US" altLang="ko-KR" sz="1100" b="1" dirty="0">
+                <a:solidFill>
+                  <a:prstClr val="black">
+                    <a:lumMod val="65000"/>
+                    <a:lumOff val="35000"/>
+                  </a:prstClr>
+                </a:solidFill>
+              </a:rPr>
+              <a:t>221124 </a:t>
+            </a:r>
+            <a:r>
+              <a:rPr lang="ko-KR" altLang="en-US" sz="1100" b="1" dirty="0">
+                <a:solidFill>
+                  <a:prstClr val="black">
+                    <a:lumMod val="65000"/>
+                    <a:lumOff val="35000"/>
+                  </a:prstClr>
+                </a:solidFill>
+              </a:rPr>
+              <a:t>키오스크 이용실태조사 보도자료</a:t>
+            </a:r>
+            <a:br>
+              <a:rPr lang="en-US" altLang="ko-KR" sz="1100" b="1" dirty="0">
+                <a:solidFill>
+                  <a:prstClr val="black">
+                    <a:lumMod val="65000"/>
+                    <a:lumOff val="35000"/>
+                  </a:prstClr>
+                </a:solidFill>
+              </a:rPr>
+            </a:br>
+            <a:r>
+              <a:rPr lang="en-US" altLang="ko-KR" sz="800" b="1" dirty="0">
+                <a:solidFill>
+                  <a:prstClr val="black">
+                    <a:lumMod val="65000"/>
+                    <a:lumOff val="35000"/>
+                  </a:prstClr>
+                </a:solidFill>
+                <a:hlinkClick r:id="rId2"/>
+              </a:rPr>
+              <a:t>https://www.kca.go.kr/home/sub.do?menukey=4002&amp;mode=view&amp;no=1003409020</a:t>
+            </a:r>
+            <a:r>
+              <a:rPr lang="en-US" altLang="ko-KR" sz="800" b="1" dirty="0">
+                <a:solidFill>
+                  <a:prstClr val="black">
+                    <a:lumMod val="65000"/>
+                    <a:lumOff val="35000"/>
+                  </a:prstClr>
+                </a:solidFill>
+              </a:rPr>
+              <a:t> </a:t>
+            </a:r>
+          </a:p>
+        </p:txBody>
+      </p:sp>
       <p:pic>
         <p:nvPicPr>
-          <p:cNvPr id="3" name="그림 2" descr="텍스트, 도표, 폰트, 스크린샷이(가) 표시된 사진&#10;&#10;자동 생성된 설명">
+          <p:cNvPr id="13" name="그림 12" descr="텍스트, 번호, 스크린샷, 폰트이(가) 표시된 사진&#10;&#10;자동 생성된 설명">
             <a:extLst>
               <a:ext uri="{FF2B5EF4-FFF2-40B4-BE49-F238E27FC236}">
-                <a16:creationId xmlns:a16="http://schemas.microsoft.com/office/drawing/2014/main" id="{FA97D1DF-CB38-FE32-D603-63C79D5B139E}"/>
+                <a16:creationId xmlns:a16="http://schemas.microsoft.com/office/drawing/2014/main" id="{4EA0990A-13FA-292D-432F-4F9670A88EBD}"/>
               </a:ext>
             </a:extLst>
           </p:cNvPr>
@@ -9242,7 +9461,7 @@
           <p:nvPr/>
         </p:nvPicPr>
         <p:blipFill>
-          <a:blip r:embed="rId2">
+          <a:blip r:embed="rId3" cstate="print">
             <a:extLst>
               <a:ext uri="{28A0092B-C50C-407E-A947-70E740481C1C}">
                 <a14:useLocalDpi xmlns:a14="http://schemas.microsoft.com/office/drawing/2010/main" val="0"/>
@@ -9255,8 +9474,44 @@
         </p:blipFill>
         <p:spPr>
           <a:xfrm>
-            <a:off x="1477518" y="1320800"/>
-            <a:ext cx="9236964" cy="5469283"/>
+            <a:off x="500273" y="2255859"/>
+            <a:ext cx="5833496" cy="3281341"/>
+          </a:xfrm>
+          <a:prstGeom prst="rect">
+            <a:avLst/>
+          </a:prstGeom>
+        </p:spPr>
+      </p:pic>
+      <p:pic>
+        <p:nvPicPr>
+          <p:cNvPr id="16" name="그림 15" descr="텍스트, 스크린샷, 폰트, 번호이(가) 표시된 사진&#10;&#10;자동 생성된 설명">
+            <a:extLst>
+              <a:ext uri="{FF2B5EF4-FFF2-40B4-BE49-F238E27FC236}">
+                <a16:creationId xmlns:a16="http://schemas.microsoft.com/office/drawing/2014/main" id="{4113EB50-6B2E-8FC8-9F61-34FF0C795DC8}"/>
+              </a:ext>
+            </a:extLst>
+          </p:cNvPr>
+          <p:cNvPicPr>
+            <a:picLocks noChangeAspect="1"/>
+          </p:cNvPicPr>
+          <p:nvPr/>
+        </p:nvPicPr>
+        <p:blipFill>
+          <a:blip r:embed="rId4" cstate="print">
+            <a:extLst>
+              <a:ext uri="{28A0092B-C50C-407E-A947-70E740481C1C}">
+                <a14:useLocalDpi xmlns:a14="http://schemas.microsoft.com/office/drawing/2010/main" val="0"/>
+              </a:ext>
+            </a:extLst>
+          </a:blip>
+          <a:stretch>
+            <a:fillRect/>
+          </a:stretch>
+        </p:blipFill>
+        <p:spPr>
+          <a:xfrm>
+            <a:off x="6236208" y="2326087"/>
+            <a:ext cx="5583792" cy="3140884"/>
           </a:xfrm>
           <a:prstGeom prst="rect">
             <a:avLst/>
@@ -9266,7 +9521,7 @@
     </p:spTree>
     <p:extLst>
       <p:ext uri="{BB962C8B-B14F-4D97-AF65-F5344CB8AC3E}">
-        <p14:creationId xmlns:p14="http://schemas.microsoft.com/office/powerpoint/2010/main" val="3446376423"/>
+        <p14:creationId xmlns:p14="http://schemas.microsoft.com/office/powerpoint/2010/main" val="1788183650"/>
       </p:ext>
     </p:extLst>
   </p:cSld>
@@ -9379,28 +9634,12 @@
                 <a:defRPr/>
               </a:pPr>
               <a:r>
-                <a:rPr lang="en-US" altLang="ko-KR" sz="2600" b="1" i="1" kern="0" dirty="0">
-                  <a:solidFill>
-                    <a:srgbClr val="FFB5B6"/>
-                  </a:solidFill>
-                </a:rPr>
-                <a:t>UI</a:t>
-              </a:r>
-              <a:r>
                 <a:rPr lang="ko-KR" altLang="en-US" sz="2600" b="1" i="1" kern="0" dirty="0">
                   <a:solidFill>
                     <a:srgbClr val="FFB5B6"/>
                   </a:solidFill>
                 </a:rPr>
-                <a:t> </a:t>
-              </a:r>
-              <a:r>
-                <a:rPr lang="en-US" altLang="ko-KR" sz="2600" b="1" i="1" kern="0" dirty="0">
-                  <a:solidFill>
-                    <a:srgbClr val="FFB5B6"/>
-                  </a:solidFill>
-                </a:rPr>
-                <a:t>&amp;</a:t>
+                <a:t>유사</a:t>
               </a:r>
               <a:r>
                 <a:rPr lang="ko-KR" altLang="en-US" sz="2600" b="1" i="1" kern="0" dirty="0">
@@ -9408,7 +9647,7 @@
                     <a:schemeClr val="bg1"/>
                   </a:solidFill>
                 </a:rPr>
-                <a:t> 시연 영상</a:t>
+                <a:t>서비스</a:t>
               </a:r>
               <a:endParaRPr lang="en-US" altLang="ko-KR" sz="2600" b="1" i="1" kern="0" dirty="0">
                 <a:solidFill>
@@ -9776,49 +10015,133 @@
           </p:txBody>
         </p:sp>
       </p:grpSp>
-      <p:sp>
-        <p:nvSpPr>
-          <p:cNvPr id="74" name="직사각형 73"/>
-          <p:cNvSpPr/>
+      <p:grpSp>
+        <p:nvGrpSpPr>
+          <p:cNvPr id="18" name="그룹 17">
+            <a:extLst>
+              <a:ext uri="{FF2B5EF4-FFF2-40B4-BE49-F238E27FC236}">
+                <a16:creationId xmlns:a16="http://schemas.microsoft.com/office/drawing/2014/main" id="{8C1DE462-B6F3-2362-AD06-134F51BBEE1E}"/>
+              </a:ext>
+            </a:extLst>
+          </p:cNvPr>
+          <p:cNvGrpSpPr/>
           <p:nvPr/>
-        </p:nvSpPr>
+        </p:nvGrpSpPr>
+        <p:grpSpPr>
+          <a:xfrm>
+            <a:off x="747888" y="1495106"/>
+            <a:ext cx="4672220" cy="5188588"/>
+            <a:chOff x="705161" y="1669410"/>
+            <a:chExt cx="4672220" cy="5188588"/>
+          </a:xfrm>
+        </p:grpSpPr>
+        <p:pic>
+          <p:nvPicPr>
+            <p:cNvPr id="3" name="그림 2" descr="텍스트, 스크린샷, 도표, 폰트이(가) 표시된 사진&#10;&#10;자동 생성된 설명">
+              <a:extLst>
+                <a:ext uri="{FF2B5EF4-FFF2-40B4-BE49-F238E27FC236}">
+                  <a16:creationId xmlns:a16="http://schemas.microsoft.com/office/drawing/2014/main" id="{DCCB0C0C-BA0F-DEA8-A13C-818F53B2443A}"/>
+                </a:ext>
+              </a:extLst>
+            </p:cNvPr>
+            <p:cNvPicPr>
+              <a:picLocks noChangeAspect="1"/>
+            </p:cNvPicPr>
+            <p:nvPr/>
+          </p:nvPicPr>
+          <p:blipFill>
+            <a:blip r:embed="rId2">
+              <a:extLst>
+                <a:ext uri="{28A0092B-C50C-407E-A947-70E740481C1C}">
+                  <a14:useLocalDpi xmlns:a14="http://schemas.microsoft.com/office/drawing/2010/main" val="0"/>
+                </a:ext>
+              </a:extLst>
+            </a:blip>
+            <a:stretch>
+              <a:fillRect/>
+            </a:stretch>
+          </p:blipFill>
+          <p:spPr>
+            <a:xfrm>
+              <a:off x="821040" y="3428999"/>
+              <a:ext cx="4556341" cy="3428999"/>
+            </a:xfrm>
+            <a:prstGeom prst="rect">
+              <a:avLst/>
+            </a:prstGeom>
+          </p:spPr>
+        </p:pic>
+        <p:pic>
+          <p:nvPicPr>
+            <p:cNvPr id="14" name="그림 13" descr="텍스트, 스크린샷, 폰트, 라인이(가) 표시된 사진&#10;&#10;자동 생성된 설명">
+              <a:extLst>
+                <a:ext uri="{FF2B5EF4-FFF2-40B4-BE49-F238E27FC236}">
+                  <a16:creationId xmlns:a16="http://schemas.microsoft.com/office/drawing/2014/main" id="{859E2871-6797-C789-A914-EF133402072F}"/>
+                </a:ext>
+              </a:extLst>
+            </p:cNvPr>
+            <p:cNvPicPr>
+              <a:picLocks noChangeAspect="1"/>
+            </p:cNvPicPr>
+            <p:nvPr/>
+          </p:nvPicPr>
+          <p:blipFill>
+            <a:blip r:embed="rId3">
+              <a:extLst>
+                <a:ext uri="{28A0092B-C50C-407E-A947-70E740481C1C}">
+                  <a14:useLocalDpi xmlns:a14="http://schemas.microsoft.com/office/drawing/2010/main" val="0"/>
+                </a:ext>
+              </a:extLst>
+            </a:blip>
+            <a:stretch>
+              <a:fillRect/>
+            </a:stretch>
+          </p:blipFill>
+          <p:spPr>
+            <a:xfrm>
+              <a:off x="705161" y="1669410"/>
+              <a:ext cx="4672220" cy="1611472"/>
+            </a:xfrm>
+            <a:prstGeom prst="rect">
+              <a:avLst/>
+            </a:prstGeom>
+          </p:spPr>
+        </p:pic>
+      </p:grpSp>
+      <p:pic>
+        <p:nvPicPr>
+          <p:cNvPr id="20" name="그림 19">
+            <a:extLst>
+              <a:ext uri="{FF2B5EF4-FFF2-40B4-BE49-F238E27FC236}">
+                <a16:creationId xmlns:a16="http://schemas.microsoft.com/office/drawing/2014/main" id="{24460AA9-0C5D-4C91-0651-A5A0FFF2515C}"/>
+              </a:ext>
+            </a:extLst>
+          </p:cNvPr>
+          <p:cNvPicPr>
+            <a:picLocks noChangeAspect="1"/>
+          </p:cNvPicPr>
+          <p:nvPr/>
+        </p:nvPicPr>
+        <p:blipFill>
+          <a:blip r:embed="rId4"/>
+          <a:stretch>
+            <a:fillRect/>
+          </a:stretch>
+        </p:blipFill>
         <p:spPr>
           <a:xfrm>
-            <a:off x="4646279" y="3468168"/>
-            <a:ext cx="2899442" cy="313547"/>
+            <a:off x="5911875" y="2005528"/>
+            <a:ext cx="5526063" cy="4109719"/>
           </a:xfrm>
           <a:prstGeom prst="rect">
             <a:avLst/>
           </a:prstGeom>
         </p:spPr>
-        <p:txBody>
-          <a:bodyPr wrap="square">
-            <a:spAutoFit/>
-          </a:bodyPr>
-          <a:lstStyle/>
-          <a:p>
-            <a:pPr algn="ctr">
-              <a:lnSpc>
-                <a:spcPct val="150000"/>
-              </a:lnSpc>
-            </a:pPr>
-            <a:r>
-              <a:rPr lang="ko-KR" altLang="en-US" sz="1100" dirty="0">
-                <a:solidFill>
-                  <a:prstClr val="white">
-                    <a:lumMod val="65000"/>
-                  </a:prstClr>
-                </a:solidFill>
-              </a:rPr>
-              <a:t>영상 </a:t>
-            </a:r>
-          </a:p>
-        </p:txBody>
-      </p:sp>
+      </p:pic>
     </p:spTree>
     <p:extLst>
       <p:ext uri="{BB962C8B-B14F-4D97-AF65-F5344CB8AC3E}">
-        <p14:creationId xmlns:p14="http://schemas.microsoft.com/office/powerpoint/2010/main" val="3010360237"/>
+        <p14:creationId xmlns:p14="http://schemas.microsoft.com/office/powerpoint/2010/main" val="1624458016"/>
       </p:ext>
     </p:extLst>
   </p:cSld>
@@ -9931,17 +10254,25 @@
                 <a:defRPr/>
               </a:pPr>
               <a:r>
+                <a:rPr lang="en-US" altLang="ko-KR" sz="2600" b="1" i="1" kern="0" dirty="0">
+                  <a:solidFill>
+                    <a:srgbClr val="FFB5B6"/>
+                  </a:solidFill>
+                </a:rPr>
+                <a:t>UI</a:t>
+              </a:r>
+              <a:r>
                 <a:rPr lang="ko-KR" altLang="en-US" sz="2600" b="1" i="1" kern="0" dirty="0">
                   <a:solidFill>
                     <a:srgbClr val="FFB5B6"/>
                   </a:solidFill>
                 </a:rPr>
-                <a:t>딥러닝 모델 </a:t>
+                <a:t> </a:t>
               </a:r>
               <a:r>
                 <a:rPr lang="en-US" altLang="ko-KR" sz="2600" b="1" i="1" kern="0" dirty="0">
                   <a:solidFill>
-                    <a:schemeClr val="bg1"/>
+                    <a:srgbClr val="FFB5B6"/>
                   </a:solidFill>
                 </a:rPr>
                 <a:t>&amp;</a:t>
@@ -9949,19 +10280,24 @@
               <a:r>
                 <a:rPr lang="ko-KR" altLang="en-US" sz="2600" b="1" i="1" kern="0" dirty="0">
                   <a:solidFill>
-                    <a:schemeClr val="bg1"/>
+                    <a:srgbClr val="FFB5B6"/>
                   </a:solidFill>
                 </a:rPr>
                 <a:t> </a:t>
               </a:r>
               <a:r>
-                <a:rPr lang="en-US" altLang="ko-KR" sz="2600" b="1" i="1" kern="0" dirty="0">
+                <a:rPr lang="ko-KR" altLang="en-US" sz="2600" b="1" i="1" kern="0" dirty="0">
                   <a:solidFill>
                     <a:schemeClr val="bg1"/>
                   </a:solidFill>
                 </a:rPr>
-                <a:t>DB</a:t>
+                <a:t>시연 영상</a:t>
               </a:r>
+              <a:endParaRPr lang="en-US" altLang="ko-KR" sz="2600" b="1" i="1" kern="0" dirty="0">
+                <a:solidFill>
+                  <a:schemeClr val="bg1"/>
+                </a:solidFill>
+              </a:endParaRPr>
             </a:p>
           </p:txBody>
         </p:sp>
@@ -10323,49 +10659,12 @@
           </p:txBody>
         </p:sp>
       </p:grpSp>
-      <p:sp>
-        <p:nvSpPr>
-          <p:cNvPr id="74" name="직사각형 73"/>
-          <p:cNvSpPr/>
-          <p:nvPr/>
-        </p:nvSpPr>
-        <p:spPr>
-          <a:xfrm>
-            <a:off x="6324188" y="1401624"/>
-            <a:ext cx="2899442" cy="373885"/>
-          </a:xfrm>
-          <a:prstGeom prst="rect">
-            <a:avLst/>
-          </a:prstGeom>
-        </p:spPr>
-        <p:txBody>
-          <a:bodyPr wrap="square">
-            <a:spAutoFit/>
-          </a:bodyPr>
-          <a:lstStyle/>
-          <a:p>
-            <a:pPr algn="ctr">
-              <a:lnSpc>
-                <a:spcPct val="150000"/>
-              </a:lnSpc>
-            </a:pPr>
-            <a:r>
-              <a:rPr lang="ko-KR" altLang="en-US" sz="1400" b="1" dirty="0">
-                <a:solidFill>
-                  <a:srgbClr val="0C2461"/>
-                </a:solidFill>
-              </a:rPr>
-              <a:t>테이블 명세서 </a:t>
-            </a:r>
-          </a:p>
-        </p:txBody>
-      </p:sp>
       <p:pic>
         <p:nvPicPr>
-          <p:cNvPr id="3" name="그림 2">
+          <p:cNvPr id="3" name="그림 2" descr="텍스트, 도표, 폰트, 스크린샷이(가) 표시된 사진&#10;&#10;자동 생성된 설명">
             <a:extLst>
               <a:ext uri="{FF2B5EF4-FFF2-40B4-BE49-F238E27FC236}">
-                <a16:creationId xmlns:a16="http://schemas.microsoft.com/office/drawing/2014/main" id="{D6FC33CD-07F0-6CCC-7261-1779EFCF6B28}"/>
+                <a16:creationId xmlns:a16="http://schemas.microsoft.com/office/drawing/2014/main" id="{FA97D1DF-CB38-FE32-D603-63C79D5B139E}"/>
               </a:ext>
             </a:extLst>
           </p:cNvPr>
@@ -10375,15 +10674,21 @@
           <p:nvPr/>
         </p:nvPicPr>
         <p:blipFill>
-          <a:blip r:embed="rId2"/>
+          <a:blip r:embed="rId2">
+            <a:extLst>
+              <a:ext uri="{28A0092B-C50C-407E-A947-70E740481C1C}">
+                <a14:useLocalDpi xmlns:a14="http://schemas.microsoft.com/office/drawing/2010/main" val="0"/>
+              </a:ext>
+            </a:extLst>
+          </a:blip>
           <a:stretch>
             <a:fillRect/>
           </a:stretch>
         </p:blipFill>
         <p:spPr>
           <a:xfrm>
-            <a:off x="7121559" y="1709764"/>
-            <a:ext cx="4204143" cy="4756351"/>
+            <a:off x="1477518" y="1320800"/>
+            <a:ext cx="9236964" cy="5469283"/>
           </a:xfrm>
           <a:prstGeom prst="rect">
             <a:avLst/>
@@ -10393,7 +10698,7 @@
     </p:spTree>
     <p:extLst>
       <p:ext uri="{BB962C8B-B14F-4D97-AF65-F5344CB8AC3E}">
-        <p14:creationId xmlns:p14="http://schemas.microsoft.com/office/powerpoint/2010/main" val="2356145611"/>
+        <p14:creationId xmlns:p14="http://schemas.microsoft.com/office/powerpoint/2010/main" val="3446376423"/>
       </p:ext>
     </p:extLst>
   </p:cSld>
@@ -10506,12 +10811,28 @@
                 <a:defRPr/>
               </a:pPr>
               <a:r>
+                <a:rPr lang="en-US" altLang="ko-KR" sz="2600" b="1" i="1" kern="0" dirty="0">
+                  <a:solidFill>
+                    <a:srgbClr val="FFB5B6"/>
+                  </a:solidFill>
+                </a:rPr>
+                <a:t>UI</a:t>
+              </a:r>
+              <a:r>
                 <a:rPr lang="ko-KR" altLang="en-US" sz="2600" b="1" i="1" kern="0" dirty="0">
                   <a:solidFill>
                     <a:srgbClr val="FFB5B6"/>
                   </a:solidFill>
                 </a:rPr>
-                <a:t>시스템</a:t>
+                <a:t> </a:t>
+              </a:r>
+              <a:r>
+                <a:rPr lang="en-US" altLang="ko-KR" sz="2600" b="1" i="1" kern="0" dirty="0">
+                  <a:solidFill>
+                    <a:srgbClr val="FFB5B6"/>
+                  </a:solidFill>
+                </a:rPr>
+                <a:t>&amp;</a:t>
               </a:r>
               <a:r>
                 <a:rPr lang="ko-KR" altLang="en-US" sz="2600" b="1" i="1" kern="0" dirty="0">
@@ -10519,7 +10840,7 @@
                     <a:schemeClr val="bg1"/>
                   </a:solidFill>
                 </a:rPr>
-                <a:t> 아키텍처</a:t>
+                <a:t> 시연 영상</a:t>
               </a:r>
               <a:endParaRPr lang="en-US" altLang="ko-KR" sz="2600" b="1" i="1" kern="0" dirty="0">
                 <a:solidFill>
@@ -10887,12 +11208,65 @@
           </p:txBody>
         </p:sp>
       </p:grpSp>
+      <p:sp>
+        <p:nvSpPr>
+          <p:cNvPr id="74" name="직사각형 73"/>
+          <p:cNvSpPr/>
+          <p:nvPr/>
+        </p:nvSpPr>
+        <p:spPr>
+          <a:xfrm>
+            <a:off x="1181588" y="1685088"/>
+            <a:ext cx="1762780" cy="655372"/>
+          </a:xfrm>
+          <a:prstGeom prst="rect">
+            <a:avLst/>
+          </a:prstGeom>
+        </p:spPr>
+        <p:txBody>
+          <a:bodyPr wrap="square">
+            <a:spAutoFit/>
+          </a:bodyPr>
+          <a:lstStyle/>
+          <a:p>
+            <a:pPr algn="ctr">
+              <a:lnSpc>
+                <a:spcPct val="150000"/>
+              </a:lnSpc>
+            </a:pPr>
+            <a:r>
+              <a:rPr lang="ko-KR" altLang="en-US" sz="2800" b="1" dirty="0">
+                <a:solidFill>
+                  <a:srgbClr val="0C2461"/>
+                </a:solidFill>
+              </a:rPr>
+              <a:t>일반용 </a:t>
+            </a:r>
+            <a:r>
+              <a:rPr lang="en-US" altLang="ko-KR" sz="2800" b="1" dirty="0">
+                <a:solidFill>
+                  <a:srgbClr val="0C2461"/>
+                </a:solidFill>
+              </a:rPr>
+              <a:t>UI</a:t>
+            </a:r>
+            <a:r>
+              <a:rPr lang="ko-KR" altLang="en-US" sz="2800" b="1" dirty="0">
+                <a:solidFill>
+                  <a:srgbClr val="0C2461"/>
+                </a:solidFill>
+              </a:rPr>
+              <a:t> </a:t>
+            </a:r>
+          </a:p>
+        </p:txBody>
+      </p:sp>
       <p:pic>
         <p:nvPicPr>
-          <p:cNvPr id="3" name="그림 2" descr="텍스트, 도표, 스크린샷이(가) 표시된 사진&#10;&#10;자동 생성된 설명">
+          <p:cNvPr id="3" name="그림 2" descr="텍스트, 스크린샷, 소프트웨어, 번호이(가) 표시된 사진&#10;&#10;자동 생성된 설명">
             <a:extLst>
               <a:ext uri="{FF2B5EF4-FFF2-40B4-BE49-F238E27FC236}">
-                <a16:creationId xmlns:a16="http://schemas.microsoft.com/office/drawing/2014/main" id="{8FC157A8-3A81-CB97-BB3F-6C9E89452E6D}"/>
+                <a16:creationId xmlns:a16="http://schemas.microsoft.com/office/drawing/2014/main" id="{6027C021-4FC5-0113-647E-F2923371CE55}"/>
               </a:ext>
             </a:extLst>
           </p:cNvPr>
@@ -10915,8 +11289,80 @@
         </p:blipFill>
         <p:spPr>
           <a:xfrm>
-            <a:off x="1398640" y="1576880"/>
-            <a:ext cx="8559176" cy="5025039"/>
+            <a:off x="4414243" y="1519061"/>
+            <a:ext cx="3363516" cy="5193121"/>
+          </a:xfrm>
+          <a:prstGeom prst="rect">
+            <a:avLst/>
+          </a:prstGeom>
+        </p:spPr>
+      </p:pic>
+      <p:pic>
+        <p:nvPicPr>
+          <p:cNvPr id="15" name="그림 14" descr="텍스트, 스크린샷, 소프트웨어, 컴퓨터 아이콘이(가) 표시된 사진&#10;&#10;자동 생성된 설명">
+            <a:extLst>
+              <a:ext uri="{FF2B5EF4-FFF2-40B4-BE49-F238E27FC236}">
+                <a16:creationId xmlns:a16="http://schemas.microsoft.com/office/drawing/2014/main" id="{17DAEAAD-FDEE-ECE6-0488-EE6DB411F906}"/>
+              </a:ext>
+            </a:extLst>
+          </p:cNvPr>
+          <p:cNvPicPr>
+            <a:picLocks noChangeAspect="1"/>
+          </p:cNvPicPr>
+          <p:nvPr/>
+        </p:nvPicPr>
+        <p:blipFill>
+          <a:blip r:embed="rId3">
+            <a:extLst>
+              <a:ext uri="{28A0092B-C50C-407E-A947-70E740481C1C}">
+                <a14:useLocalDpi xmlns:a14="http://schemas.microsoft.com/office/drawing/2010/main" val="0"/>
+              </a:ext>
+            </a:extLst>
+          </a:blip>
+          <a:stretch>
+            <a:fillRect/>
+          </a:stretch>
+        </p:blipFill>
+        <p:spPr>
+          <a:xfrm>
+            <a:off x="8177786" y="1515738"/>
+            <a:ext cx="3363516" cy="5196444"/>
+          </a:xfrm>
+          <a:prstGeom prst="rect">
+            <a:avLst/>
+          </a:prstGeom>
+        </p:spPr>
+      </p:pic>
+      <p:pic>
+        <p:nvPicPr>
+          <p:cNvPr id="4" name="그림 3" descr="텍스트, 스크린샷이(가) 표시된 사진&#10;&#10;자동 생성된 설명">
+            <a:extLst>
+              <a:ext uri="{FF2B5EF4-FFF2-40B4-BE49-F238E27FC236}">
+                <a16:creationId xmlns:a16="http://schemas.microsoft.com/office/drawing/2014/main" id="{156F5119-D225-16A3-ED82-E21A1CF31BCD}"/>
+              </a:ext>
+            </a:extLst>
+          </p:cNvPr>
+          <p:cNvPicPr>
+            <a:picLocks noChangeAspect="1"/>
+          </p:cNvPicPr>
+          <p:nvPr/>
+        </p:nvPicPr>
+        <p:blipFill>
+          <a:blip r:embed="rId4">
+            <a:extLst>
+              <a:ext uri="{28A0092B-C50C-407E-A947-70E740481C1C}">
+                <a14:useLocalDpi xmlns:a14="http://schemas.microsoft.com/office/drawing/2010/main" val="0"/>
+              </a:ext>
+            </a:extLst>
+          </a:blip>
+          <a:stretch>
+            <a:fillRect/>
+          </a:stretch>
+        </p:blipFill>
+        <p:spPr>
+          <a:xfrm>
+            <a:off x="652122" y="1515738"/>
+            <a:ext cx="3362093" cy="5193122"/>
           </a:xfrm>
           <a:prstGeom prst="rect">
             <a:avLst/>
@@ -10926,7 +11372,7 @@
     </p:spTree>
     <p:extLst>
       <p:ext uri="{BB962C8B-B14F-4D97-AF65-F5344CB8AC3E}">
-        <p14:creationId xmlns:p14="http://schemas.microsoft.com/office/powerpoint/2010/main" val="3019334624"/>
+        <p14:creationId xmlns:p14="http://schemas.microsoft.com/office/powerpoint/2010/main" val="3010360237"/>
       </p:ext>
     </p:extLst>
   </p:cSld>
@@ -11039,20 +11485,36 @@
                 <a:defRPr/>
               </a:pPr>
               <a:r>
+                <a:rPr lang="en-US" altLang="ko-KR" sz="2600" b="1" i="1" kern="0" dirty="0">
+                  <a:solidFill>
+                    <a:srgbClr val="FFB5B6"/>
+                  </a:solidFill>
+                </a:rPr>
+                <a:t>UI</a:t>
+              </a:r>
+              <a:r>
                 <a:rPr lang="ko-KR" altLang="en-US" sz="2600" b="1" i="1" kern="0" dirty="0">
                   <a:solidFill>
                     <a:srgbClr val="FFB5B6"/>
                   </a:solidFill>
                 </a:rPr>
-                <a:t>그 외 추가하길 </a:t>
+                <a:t> </a:t>
               </a:r>
               <a:r>
-                <a:rPr lang="ko-KR" altLang="en-US" sz="2600" b="1" i="1" kern="0" dirty="0" err="1">
+                <a:rPr lang="en-US" altLang="ko-KR" sz="2600" b="1" i="1" kern="0" dirty="0">
                   <a:solidFill>
                     <a:srgbClr val="FFB5B6"/>
                   </a:solidFill>
                 </a:rPr>
-                <a:t>원하는부분</a:t>
+                <a:t>&amp;</a:t>
+              </a:r>
+              <a:r>
+                <a:rPr lang="ko-KR" altLang="en-US" sz="2600" b="1" i="1" kern="0" dirty="0">
+                  <a:solidFill>
+                    <a:schemeClr val="bg1"/>
+                  </a:solidFill>
+                </a:rPr>
+                <a:t> 시연 영상</a:t>
               </a:r>
               <a:endParaRPr lang="en-US" altLang="ko-KR" sz="2600" b="1" i="1" kern="0" dirty="0">
                 <a:solidFill>
@@ -11428,8 +11890,8 @@
         </p:nvSpPr>
         <p:spPr>
           <a:xfrm>
-            <a:off x="744138" y="1876309"/>
-            <a:ext cx="2899442" cy="414024"/>
+            <a:off x="4646279" y="3468168"/>
+            <a:ext cx="2899442" cy="313547"/>
           </a:xfrm>
           <a:prstGeom prst="rect">
             <a:avLst/>
@@ -11447,30 +11909,22 @@
               </a:lnSpc>
             </a:pPr>
             <a:r>
-              <a:rPr lang="en-US" altLang="ko-KR" sz="1600" b="1" dirty="0">
-                <a:solidFill>
-                  <a:prstClr val="black">
+              <a:rPr lang="ko-KR" altLang="en-US" sz="1100" dirty="0">
+                <a:solidFill>
+                  <a:prstClr val="white">
                     <a:lumMod val="65000"/>
-                    <a:lumOff val="35000"/>
                   </a:prstClr>
                 </a:solidFill>
               </a:rPr>
-              <a:t>ASDFASDF</a:t>
-            </a:r>
-            <a:endParaRPr lang="ko-KR" altLang="en-US" sz="1100" dirty="0">
-              <a:solidFill>
-                <a:prstClr val="white">
-                  <a:lumMod val="65000"/>
-                </a:prstClr>
-              </a:solidFill>
-            </a:endParaRPr>
+              <a:t>영상 </a:t>
+            </a:r>
           </a:p>
         </p:txBody>
       </p:sp>
     </p:spTree>
     <p:extLst>
       <p:ext uri="{BB962C8B-B14F-4D97-AF65-F5344CB8AC3E}">
-        <p14:creationId xmlns:p14="http://schemas.microsoft.com/office/powerpoint/2010/main" val="2759864536"/>
+        <p14:creationId xmlns:p14="http://schemas.microsoft.com/office/powerpoint/2010/main" val="2701742171"/>
       </p:ext>
     </p:extLst>
   </p:cSld>
@@ -11588,7 +12042,15 @@
                     <a:srgbClr val="FFB5B6"/>
                   </a:solidFill>
                 </a:rPr>
-                <a:t>활용 </a:t>
+                <a:t>딥러닝 모델 </a:t>
+              </a:r>
+              <a:r>
+                <a:rPr lang="en-US" altLang="ko-KR" sz="2600" b="1" i="1" kern="0" dirty="0">
+                  <a:solidFill>
+                    <a:schemeClr val="bg1"/>
+                  </a:solidFill>
+                </a:rPr>
+                <a:t>&amp;</a:t>
               </a:r>
               <a:r>
                 <a:rPr lang="ko-KR" altLang="en-US" sz="2600" b="1" i="1" kern="0" dirty="0">
@@ -11596,13 +12058,16 @@
                     <a:schemeClr val="bg1"/>
                   </a:solidFill>
                 </a:rPr>
-                <a:t>기술</a:t>
+                <a:t> </a:t>
               </a:r>
-              <a:endParaRPr lang="en-US" altLang="ko-KR" sz="2600" b="1" i="1" kern="0" dirty="0">
-                <a:solidFill>
-                  <a:schemeClr val="bg1"/>
-                </a:solidFill>
-              </a:endParaRPr>
+              <a:r>
+                <a:rPr lang="en-US" altLang="ko-KR" sz="2600" b="1" i="1" kern="0" dirty="0">
+                  <a:solidFill>
+                    <a:schemeClr val="bg1"/>
+                  </a:solidFill>
+                </a:rPr>
+                <a:t>DB</a:t>
+              </a:r>
             </a:p>
           </p:txBody>
         </p:sp>
@@ -11964,12 +12429,49 @@
           </p:txBody>
         </p:sp>
       </p:grpSp>
+      <p:sp>
+        <p:nvSpPr>
+          <p:cNvPr id="74" name="직사각형 73"/>
+          <p:cNvSpPr/>
+          <p:nvPr/>
+        </p:nvSpPr>
+        <p:spPr>
+          <a:xfrm>
+            <a:off x="8662785" y="1335876"/>
+            <a:ext cx="1485675" cy="373885"/>
+          </a:xfrm>
+          <a:prstGeom prst="rect">
+            <a:avLst/>
+          </a:prstGeom>
+        </p:spPr>
+        <p:txBody>
+          <a:bodyPr wrap="square">
+            <a:spAutoFit/>
+          </a:bodyPr>
+          <a:lstStyle/>
+          <a:p>
+            <a:pPr algn="ctr">
+              <a:lnSpc>
+                <a:spcPct val="150000"/>
+              </a:lnSpc>
+            </a:pPr>
+            <a:r>
+              <a:rPr lang="ko-KR" altLang="en-US" sz="1400" b="1" dirty="0">
+                <a:solidFill>
+                  <a:srgbClr val="0C2461"/>
+                </a:solidFill>
+              </a:rPr>
+              <a:t>테이블 명세서 </a:t>
+            </a:r>
+          </a:p>
+        </p:txBody>
+      </p:sp>
       <p:pic>
         <p:nvPicPr>
-          <p:cNvPr id="3" name="그림 2" descr="텍스트, 스크린샷, 폰트, 도표이(가) 표시된 사진&#10;&#10;자동 생성된 설명">
+          <p:cNvPr id="3" name="그림 2">
             <a:extLst>
               <a:ext uri="{FF2B5EF4-FFF2-40B4-BE49-F238E27FC236}">
-                <a16:creationId xmlns:a16="http://schemas.microsoft.com/office/drawing/2014/main" id="{D67D7244-6B39-541C-1DDA-7ACCE02CE02C}"/>
+                <a16:creationId xmlns:a16="http://schemas.microsoft.com/office/drawing/2014/main" id="{D6FC33CD-07F0-6CCC-7261-1779EFCF6B28}"/>
               </a:ext>
             </a:extLst>
           </p:cNvPr>
@@ -11979,7 +12481,37 @@
           <p:nvPr/>
         </p:nvPicPr>
         <p:blipFill>
-          <a:blip r:embed="rId2">
+          <a:blip r:embed="rId2"/>
+          <a:stretch>
+            <a:fillRect/>
+          </a:stretch>
+        </p:blipFill>
+        <p:spPr>
+          <a:xfrm>
+            <a:off x="7303552" y="1709762"/>
+            <a:ext cx="4204143" cy="4756351"/>
+          </a:xfrm>
+          <a:prstGeom prst="rect">
+            <a:avLst/>
+          </a:prstGeom>
+        </p:spPr>
+      </p:pic>
+      <p:pic>
+        <p:nvPicPr>
+          <p:cNvPr id="4" name="그림 3" descr="텍스트, 스크린샷, 폰트, 번호이(가) 표시된 사진&#10;&#10;자동 생성된 설명">
+            <a:extLst>
+              <a:ext uri="{FF2B5EF4-FFF2-40B4-BE49-F238E27FC236}">
+                <a16:creationId xmlns:a16="http://schemas.microsoft.com/office/drawing/2014/main" id="{8B440A00-504A-E6EC-8A31-69AD80EA64FC}"/>
+              </a:ext>
+            </a:extLst>
+          </p:cNvPr>
+          <p:cNvPicPr>
+            <a:picLocks noChangeAspect="1"/>
+          </p:cNvPicPr>
+          <p:nvPr/>
+        </p:nvPicPr>
+        <p:blipFill>
+          <a:blip r:embed="rId3">
             <a:extLst>
               <a:ext uri="{28A0092B-C50C-407E-A947-70E740481C1C}">
                 <a14:useLocalDpi xmlns:a14="http://schemas.microsoft.com/office/drawing/2010/main" val="0"/>
@@ -11992,18 +12524,61 @@
         </p:blipFill>
         <p:spPr>
           <a:xfrm>
-            <a:off x="2099352" y="1761202"/>
-            <a:ext cx="7993296" cy="4656396"/>
+            <a:off x="471697" y="2023102"/>
+            <a:ext cx="6649862" cy="4129673"/>
           </a:xfrm>
           <a:prstGeom prst="rect">
             <a:avLst/>
           </a:prstGeom>
         </p:spPr>
       </p:pic>
+      <p:sp>
+        <p:nvSpPr>
+          <p:cNvPr id="13" name="직사각형 12">
+            <a:extLst>
+              <a:ext uri="{FF2B5EF4-FFF2-40B4-BE49-F238E27FC236}">
+                <a16:creationId xmlns:a16="http://schemas.microsoft.com/office/drawing/2014/main" id="{0E2CC6EF-9CBF-0DB0-CF9D-46425FF21F21}"/>
+              </a:ext>
+            </a:extLst>
+          </p:cNvPr>
+          <p:cNvSpPr/>
+          <p:nvPr/>
+        </p:nvSpPr>
+        <p:spPr>
+          <a:xfrm>
+            <a:off x="3053790" y="1396193"/>
+            <a:ext cx="1485675" cy="373885"/>
+          </a:xfrm>
+          <a:prstGeom prst="rect">
+            <a:avLst/>
+          </a:prstGeom>
+        </p:spPr>
+        <p:txBody>
+          <a:bodyPr wrap="square">
+            <a:spAutoFit/>
+          </a:bodyPr>
+          <a:lstStyle/>
+          <a:p>
+            <a:pPr algn="ctr">
+              <a:lnSpc>
+                <a:spcPct val="150000"/>
+              </a:lnSpc>
+            </a:pPr>
+            <a:r>
+              <a:rPr lang="ko-KR" altLang="en-US" sz="1400" b="1" dirty="0">
+                <a:solidFill>
+                  <a:srgbClr val="0C2461"/>
+                </a:solidFill>
+              </a:rPr>
+              <a:t>딥러닝 모델</a:t>
+            </a:r>
+          </a:p>
+        </p:txBody>
+      </p:sp>
     </p:spTree>
     <p:extLst>
       <p:ext uri="{BB962C8B-B14F-4D97-AF65-F5344CB8AC3E}">
-        <p14:creationId xmlns:p14="http://schemas.microsoft.com/office/powerpoint/2010/main" val="138636634"/>
+        <p14:creationId xmlns:p14="http://schemas.microsoft.com/office/powerpoint/2010/main" val="2356145611"/>
       </p:ext>
     </p:extLst>
   </p:cSld>

</xml_diff>